<commit_message>
Minor Updates to Files
Added slides.
Spaced Process Doc + minor additions and edits.
</commit_message>
<xml_diff>
--- a/TWS Final Presentation Slides.pptx
+++ b/TWS Final Presentation Slides.pptx
@@ -46,7 +46,7 @@
       <style:graphic-properties style:protect="size"/>
     </style:style>
     <style:style style:name="gr3" style:family="graphic" style:parent-style-name="Object_20_with_20_no_20_fill_20_and_20_no_20_line">
-      <style:graphic-properties draw:textarea-vertical-align="middle" draw:color-mode="standard" draw:luminance="0%" draw:contrast="0%" draw:gamma="100%" draw:red="0%" draw:green="0%" draw:blue="0%" fo:clip="rect(0cm, 0cm, 0cm, 0cm)" draw:image-opacity="100%" style:mirror="none"/>
+      <style:graphic-properties draw:stroke="none" draw:fill="none" draw:textarea-vertical-align="middle" draw:color-mode="standard" draw:luminance="0%" draw:contrast="0%" draw:gamma="100%" draw:red="0%" draw:green="0%" draw:blue="0%" fo:clip="rect(0cm, 0cm, 0cm, 0cm)" draw:image-opacity="100%" style:mirror="none"/>
     </style:style>
     <style:style style:name="pr1" style:family="presentation" style:parent-style-name="Default-title">
       <style:graphic-properties draw:stroke="none" svg:stroke-width="0cm" draw:fill="none" draw:textarea-vertical-align="middle" draw:auto-grow-height="false" fo:min-height="2.63cm" fo:padding-top="0cm" fo:padding-bottom="0cm" fo:padding-left="0cm" fo:padding-right="0cm" fo:wrap-option="wrap"/>
@@ -85,6 +85,9 @@
     </style:style>
     <style:style style:name="T2" style:family="text">
       <style:text-properties style:text-line-through-style="none" fo:font-family="Arial" fo:font-size="32pt" fo:letter-spacing="normal" fo:font-style="normal" style:text-underline-style="none" fo:font-weight="normal" style:font-size-asian="32pt" style:font-style-asian="normal" style:font-weight-asian="normal" style:font-size-complex="32pt" style:font-style-complex="normal" style:font-weight-complex="normal"/>
+    </style:style>
+    <style:style style:name="T3" style:family="text">
+      <style:text-properties fo:color="#0d0d0d" style:text-outline="false" style:text-line-through-style="none" fo:font-family="Arial" fo:font-size="32pt" fo:letter-spacing="normal" fo:font-style="normal" fo:text-shadow="none" style:text-underline-style="none" fo:font-weight="normal" style:letter-kerning="true" style:font-family-asian="'Microsoft YaHei'" style:font-family-generic-asian="system" style:font-pitch-asian="variable" style:font-size-asian="32pt" style:font-style-asian="normal" style:font-weight-asian="normal" style:font-family-complex="'Times New Roman'" style:font-family-generic-complex="roman" style:font-pitch-complex="variable" style:font-size-complex="32pt" style:font-style-complex="normal" style:font-weight-complex="normal" style:text-emphasize="none" style:font-relief="none" style:text-overline-style="none" style:text-overline-color="font-color"/>
     </style:style>
     <text:list-style style:name="L1">
       <text:list-level-style-bullet text:level="1" text:bullet-char="●">
@@ -170,14 +173,57 @@
         <style:text-properties fo:font-family="StarSymbol" style:use-window-font-color="true" fo:font-size="45%"/>
       </text:list-level-style-bullet>
     </text:list-style>
+    <text:list-style style:name="L3">
+      <text:list-level-style-bullet text:level="1" text:bullet-char="●">
+        <style:list-level-properties text:space-before="0.3cm" text:min-label-width="0.9cm"/>
+        <style:text-properties fo:font-family="StarSymbol" style:use-window-font-color="true" fo:font-size="45%"/>
+      </text:list-level-style-bullet>
+      <text:list-level-style-bullet text:level="2" text:bullet-char="–">
+        <style:list-level-properties text:space-before="1.5cm" text:min-label-width="0.9cm"/>
+        <style:text-properties fo:font-family="StarSymbol" style:use-window-font-color="true" fo:font-size="75%"/>
+      </text:list-level-style-bullet>
+      <text:list-level-style-bullet text:level="3" text:bullet-char="●">
+        <style:list-level-properties text:space-before="2.8cm" text:min-label-width="0.8cm"/>
+        <style:text-properties fo:font-family="StarSymbol" style:use-window-font-color="true" fo:font-size="45%"/>
+      </text:list-level-style-bullet>
+      <text:list-level-style-bullet text:level="4" text:bullet-char="–">
+        <style:list-level-properties text:space-before="4.2cm" text:min-label-width="0.6cm"/>
+        <style:text-properties fo:font-family="StarSymbol" style:use-window-font-color="true" fo:font-size="75%"/>
+      </text:list-level-style-bullet>
+      <text:list-level-style-bullet text:level="5" text:bullet-char="●">
+        <style:list-level-properties text:space-before="5.4cm" text:min-label-width="0.6cm"/>
+        <style:text-properties fo:font-family="StarSymbol" style:use-window-font-color="true" fo:font-size="45%"/>
+      </text:list-level-style-bullet>
+      <text:list-level-style-bullet text:level="6" text:bullet-char="●">
+        <style:list-level-properties text:space-before="6.6cm" text:min-label-width="0.6cm"/>
+        <style:text-properties fo:font-family="StarSymbol" style:use-window-font-color="true" fo:font-size="45%"/>
+      </text:list-level-style-bullet>
+      <text:list-level-style-bullet text:level="7" text:bullet-char="●">
+        <style:list-level-properties text:space-before="7.8cm" text:min-label-width="0.6cm"/>
+        <style:text-properties fo:font-family="StarSymbol" style:use-window-font-color="true" fo:font-size="45%"/>
+      </text:list-level-style-bullet>
+      <text:list-level-style-bullet text:level="8" text:bullet-char="●">
+        <style:list-level-properties text:space-before="9cm" text:min-label-width="0.6cm"/>
+        <style:text-properties fo:font-family="StarSymbol" style:use-window-font-color="true" fo:font-size="45%"/>
+      </text:list-level-style-bullet>
+      <text:list-level-style-bullet text:level="9" text:bullet-char="●">
+        <style:list-level-properties text:space-before="10.2cm" text:min-label-width="0.6cm"/>
+        <style:text-properties fo:font-family="StarSymbol" style:use-window-font-color="true" fo:font-size="45%"/>
+      </text:list-level-style-bullet>
+      <text:list-level-style-bullet text:level="10" text:bullet-char="●">
+        <style:list-level-properties text:space-before="11.4cm" text:min-label-width="0.6cm"/>
+        <style:text-properties fo:font-family="StarSymbol" style:use-window-font-color="true" fo:font-size="45%"/>
+      </text:list-level-style-bullet>
+    </text:list-style>
   </office:automatic-styles>
   <office:body>
     <office:presentation>
       <draw:page draw:name="page1" draw:style-name="dp1" draw:master-page-name="Default" presentation:presentation-page-layout-name="AL1T1">
+        <office:forms form:automatic-focus="false" form:apply-design-mode="false"/>
         <draw:frame draw:name="PlaceHolder 1" presentation:style-name="pr1" draw:text-style-name="P2" draw:layer="layout" svg:width="25.198cm" svg:height="3.472cm" svg:x="1.4cm" svg:y="0.206cm" presentation:class="title" presentation:user-transformed="true">
           <draw:text-box>
             <text:p text:style-name="P1">
-              <text:span text:style-name="T1">Creating A Ticket to Establish a VPN Connection to work from home</text:span>
+              <text:span text:style-name="T1">Creating A Ticket to Establish a VPN Connection to Work From Home</text:span>
             </text:p>
           </draw:text-box>
         </draw:frame>
@@ -194,6 +240,7 @@
         </presentation:notes>
       </draw:page>
       <draw:page draw:name="What is a VPN?" draw:style-name="dp1" draw:master-page-name="Default_20_1" presentation:presentation-page-layout-name="AL2T11">
+        <office:forms form:automatic-focus="false" form:apply-design-mode="false"/>
         <draw:frame draw:name="PlaceHolder 1" presentation:style-name="pr3" draw:text-style-name="P2" draw:layer="layout" svg:width="25.198cm" svg:height="2.628cm" svg:x="1.4cm" svg:y="0.628cm" presentation:class="title" presentation:user-transformed="true">
           <draw:text-box>
             <text:p text:style-name="P1">
@@ -230,7 +277,7 @@
             </text:p>
           </draw:text-box>
         </draw:frame>
-        <anim:par smil:dur="indefinite" smil:restart="never" presentation:node-type="timing-root">
+        <anim:par presentation:node-type="timing-root">
           <anim:seq smil:dur="indefinite" presentation:node-type="main-sequence">
             <anim:par smil:begin="next" smil:fill="hold">
               <anim:par smil:begin="0s" smil:fill="hold">
@@ -269,11 +316,12 @@
           </draw:frame>
         </presentation:notes>
       </draw:page>
-      <draw:page draw:name="Prerequisites" draw:style-name="dp1" draw:master-page-name="Default_20_1" presentation:presentation-page-layout-name="AL2T11">
+      <draw:page draw:name="page3" draw:style-name="dp1" draw:master-page-name="Default_20_1" presentation:presentation-page-layout-name="AL2T11">
+        <office:forms form:automatic-focus="false" form:apply-design-mode="false"/>
         <draw:frame draw:name="PlaceHolder 1" presentation:style-name="pr3" draw:text-style-name="P2" draw:layer="layout" svg:width="25.198cm" svg:height="2.628cm" svg:x="1.4cm" svg:y="0.628cm" presentation:class="title" presentation:user-transformed="true">
           <draw:text-box>
             <text:p text:style-name="P1">
-              <text:span text:style-name="T1">Prerequisites</text:span>
+              <text:span text:style-name="T1">Purpose</text:span>
             </text:p>
           </draw:text-box>
         </draw:frame>
@@ -282,16 +330,135 @@
             <text:list text:style-name="L2">
               <text:list-item>
                 <text:p xml:id="id5" text:id="id5" text:style-name="P4">
+                  <text:span text:style-name="T3">Creation of a ticket to request a VPN connection for remote work.</text:span>
+                </text:p>
+              </text:list-item>
+            </text:list>
+            <text:p text:style-name="P4">
+              <text:span text:style-name="T2"/>
+            </text:p>
+          </draw:text-box>
+        </draw:frame>
+        <anim:par presentation:node-type="timing-root">
+          <anim:seq presentation:node-type="main-sequence">
+            <anim:par smil:begin="next">
+              <anim:par smil:begin="0s">
+                <anim:par smil:begin="0s" smil:fill="hold" presentation:node-type="on-click" presentation:preset-class="entrance" presentation:preset-id="ooo-entrance-appear">
+                  <anim:set smil:begin="0s" smil:dur="0.001s" smil:fill="hold" smil:targetElement="id5" anim:sub-item="text" smil:attributeName="visibility" smil:to="visible"/>
+                </anim:par>
+              </anim:par>
+            </anim:par>
+          </anim:seq>
+        </anim:par>
+        <presentation:notes draw:style-name="dp2">
+          <office:forms form:automatic-focus="false" form:apply-design-mode="false"/>
+          <draw:page-thumbnail draw:style-name="gr2" draw:layer="layout" svg:width="13.968cm" svg:height="10.476cm" svg:x="3.81cm" svg:y="2.123cm" draw:page-number="3" presentation:class="page"/>
+          <draw:frame presentation:style-name="pr5" draw:text-style-name="P5" draw:layer="layout" svg:width="17.271cm" svg:height="12.572cm" svg:x="2.159cm" svg:y="13.271cm" presentation:class="notes" presentation:placeholder="true">
+            <draw:text-box/>
+          </draw:frame>
+        </presentation:notes>
+      </draw:page>
+      <draw:page draw:name="page4" draw:style-name="dp1" draw:master-page-name="Default_20_1" presentation:presentation-page-layout-name="AL2T11">
+        <office:forms form:automatic-focus="false" form:apply-design-mode="false"/>
+        <draw:frame draw:name="PlaceHolder 1" presentation:style-name="pr3" draw:text-style-name="P2" draw:layer="layout" svg:width="25.198cm" svg:height="2.628cm" svg:x="1.4cm" svg:y="0.628cm" presentation:class="title" presentation:user-transformed="true">
+          <draw:text-box>
+            <text:p text:style-name="P1">
+              <text:span text:style-name="T1">Scope</text:span>
+            </text:p>
+          </draw:text-box>
+        </draw:frame>
+        <draw:frame draw:name="PlaceHolder 2" presentation:style-name="pr4" draw:text-style-name="P2" draw:layer="layout" svg:width="25.198cm" svg:height="9.133cm" svg:x="1.4cm" svg:y="3.685cm" presentation:class="outline" presentation:user-transformed="true">
+          <draw:text-box>
+            <text:list text:style-name="L2">
+              <text:list-item>
+                <text:p xml:id="id6" text:id="id6" text:style-name="P4">
+                  <text:span text:style-name="T3">
+                    <text:s text:c="4"/>
+                  </text:span>
+                  <text:span text:style-name="T3">1. Logging into Ticket Creation Platform </text:span>
+                </text:p>
+              </text:list-item>
+              <text:list-item>
+                <text:p text:style-name="P4">
+                  <text:span text:style-name="T3">
+                    <text:s text:c="4"/>
+                  </text:span>
+                  <text:span text:style-name="T3">2. Creating and Submitting the Ticket</text:span>
+                </text:p>
+              </text:list-item>
+              <text:list-item>
+                <text:p text:style-name="P4">
+                  <text:span text:style-name="T3">
+                    <text:s text:c="4"/>
+                  </text:span>
+                  <text:span text:style-name="T3">3. Confirmation and Tracking</text:span>
+                </text:p>
+              </text:list-item>
+              <text:list-item>
+                <text:p text:style-name="P4">
+                  <text:span text:style-name="T3">
+                    <text:s text:c="4"/>
+                  </text:span>
+                  <text:span text:style-name="T3">4. Agent Follow-Up</text:span>
+                </text:p>
+              </text:list-item>
+              <text:list-item>
+                <text:p text:style-name="P4">
+                  <text:span text:style-name="T3">
+                    <text:s text:c="4"/>
+                  </text:span>
+                  <text:span text:style-name="T3">5. Ticket Resolution and Closure</text:span>
+                </text:p>
+              </text:list-item>
+            </text:list>
+            <text:p text:style-name="P4">
+              <text:span text:style-name="T2"/>
+            </text:p>
+          </draw:text-box>
+        </draw:frame>
+        <anim:par presentation:node-type="timing-root">
+          <anim:seq presentation:node-type="main-sequence">
+            <anim:par smil:begin="next">
+              <anim:par smil:begin="0s">
+                <anim:par smil:begin="0s" smil:fill="hold" presentation:node-type="on-click" presentation:preset-class="entrance" presentation:preset-id="ooo-entrance-appear">
+                  <anim:set smil:begin="0s" smil:dur="0.001s" smil:fill="hold" smil:targetElement="id6" anim:sub-item="text" smil:attributeName="visibility" smil:to="visible"/>
+                </anim:par>
+              </anim:par>
+            </anim:par>
+          </anim:seq>
+        </anim:par>
+        <presentation:notes draw:style-name="dp2">
+          <office:forms form:automatic-focus="false" form:apply-design-mode="false"/>
+          <draw:page-thumbnail draw:style-name="gr2" draw:layer="layout" svg:width="13.968cm" svg:height="10.476cm" svg:x="3.81cm" svg:y="2.123cm" draw:page-number="4" presentation:class="page"/>
+          <draw:frame presentation:style-name="pr5" draw:text-style-name="P5" draw:layer="layout" svg:width="17.271cm" svg:height="12.572cm" svg:x="2.159cm" svg:y="13.271cm" presentation:class="notes" presentation:placeholder="true">
+            <draw:text-box/>
+          </draw:frame>
+        </presentation:notes>
+      </draw:page>
+      <draw:page draw:name="Prerequisites" draw:style-name="dp1" draw:master-page-name="Default_20_1" presentation:presentation-page-layout-name="AL2T11">
+        <office:forms form:automatic-focus="false" form:apply-design-mode="false"/>
+        <draw:frame draw:name="PlaceHolder 1" presentation:style-name="pr3" draw:text-style-name="P2" draw:layer="layout" svg:width="25.198cm" svg:height="2.628cm" svg:x="1.4cm" svg:y="0.628cm" presentation:class="title" presentation:user-transformed="true">
+          <draw:text-box>
+            <text:p text:style-name="P1">
+              <text:span text:style-name="T1">Prerequisites</text:span>
+            </text:p>
+          </draw:text-box>
+        </draw:frame>
+        <draw:frame draw:name="PlaceHolder 2" presentation:style-name="pr4" draw:text-style-name="P2" draw:layer="layout" svg:width="25.198cm" svg:height="9.133cm" svg:x="1.4cm" svg:y="3.685cm" presentation:class="outline" presentation:user-transformed="true">
+          <draw:text-box>
+            <text:list text:style-name="L2">
+              <text:list-item>
+                <text:p xml:id="id7" text:id="id7" text:style-name="P4">
                   <text:span text:style-name="T2">VPN Service Information</text:span>
                 </text:p>
               </text:list-item>
               <text:list-item>
-                <text:p xml:id="id6" text:id="id6" text:style-name="P4">
+                <text:p xml:id="id8" text:id="id8" text:style-name="P4">
                   <text:span text:style-name="T2">Your credentials</text:span>
                 </text:p>
               </text:list-item>
               <text:list-item>
-                <text:p xml:id="id7" text:id="id7" text:style-name="P4">
+                <text:p xml:id="id9" text:id="id9" text:style-name="P4">
                   <text:span text:style-name="T2">Guide for setting up a VPN</text:span>
                 </text:p>
               </text:list-item>
@@ -301,22 +468,8 @@
             </text:p>
           </draw:text-box>
         </draw:frame>
-        <anim:par smil:dur="indefinite" smil:restart="never" presentation:node-type="timing-root">
+        <anim:par presentation:node-type="timing-root">
           <anim:seq smil:dur="indefinite" presentation:node-type="main-sequence">
-            <anim:par smil:begin="next" smil:fill="hold">
-              <anim:par smil:begin="0s" smil:fill="hold">
-                <anim:par smil:begin="0s" smil:fill="hold" presentation:node-type="on-click" presentation:preset-class="entrance" presentation:preset-id="ooo-entrance-appear">
-                  <anim:set smil:begin="0s" smil:dur="0.001s" smil:fill="hold" smil:targetElement="id5" anim:sub-item="text" smil:attributeName="visibility" smil:to="visible"/>
-                </anim:par>
-              </anim:par>
-            </anim:par>
-            <anim:par smil:begin="next" smil:fill="hold">
-              <anim:par smil:begin="0s" smil:fill="hold">
-                <anim:par smil:begin="0s" smil:fill="hold" presentation:node-type="on-click" presentation:preset-class="entrance" presentation:preset-id="ooo-entrance-appear">
-                  <anim:set smil:begin="0s" smil:dur="0.001s" smil:fill="hold" smil:targetElement="id6" anim:sub-item="text" smil:attributeName="visibility" smil:to="visible"/>
-                </anim:par>
-              </anim:par>
-            </anim:par>
             <anim:par smil:begin="next" smil:fill="hold">
               <anim:par smil:begin="0s" smil:fill="hold">
                 <anim:par smil:begin="0s" smil:fill="hold" presentation:node-type="on-click" presentation:preset-class="entrance" presentation:preset-id="ooo-entrance-appear">
@@ -324,48 +477,22 @@
                 </anim:par>
               </anim:par>
             </anim:par>
+            <anim:par smil:begin="next" smil:fill="hold">
+              <anim:par smil:begin="0s" smil:fill="hold">
+                <anim:par smil:begin="0s" smil:fill="hold" presentation:node-type="on-click" presentation:preset-class="entrance" presentation:preset-id="ooo-entrance-appear">
+                  <anim:set smil:begin="0s" smil:dur="0.001s" smil:fill="hold" smil:targetElement="id8" anim:sub-item="text" smil:attributeName="visibility" smil:to="visible"/>
+                </anim:par>
+              </anim:par>
+            </anim:par>
+            <anim:par smil:begin="next" smil:fill="hold">
+              <anim:par smil:begin="0s" smil:fill="hold">
+                <anim:par smil:begin="0s" smil:fill="hold" presentation:node-type="on-click" presentation:preset-class="entrance" presentation:preset-id="ooo-entrance-appear">
+                  <anim:set smil:begin="0s" smil:dur="0.001s" smil:fill="hold" smil:targetElement="id9" anim:sub-item="text" smil:attributeName="visibility" smil:to="visible"/>
+                </anim:par>
+              </anim:par>
+            </anim:par>
           </anim:seq>
         </anim:par>
-        <presentation:notes draw:style-name="dp2">
-          <draw:page-thumbnail draw:style-name="gr2" draw:layer="layout" svg:width="18.623cm" svg:height="10.476cm" svg:x="1.483cm" svg:y="2.123cm" draw:page-number="3" presentation:class="page"/>
-          <draw:frame presentation:style-name="pr5" draw:layer="layout" svg:width="17.271cm" svg:height="12.572cm" svg:x="2.159cm" svg:y="13.271cm" presentation:class="notes" presentation:placeholder="true">
-            <draw:text-box/>
-          </draw:frame>
-        </presentation:notes>
-      </draw:page>
-      <draw:page draw:name="Step 1: Login to Freshdesk" draw:style-name="dp1" draw:master-page-name="Default_20_1" presentation:presentation-page-layout-name="AL2T11">
-        <draw:frame draw:name="PlaceHolder 1" presentation:style-name="pr3" draw:text-style-name="P2" draw:layer="layout" svg:width="25.198cm" svg:height="2.628cm" svg:x="1.4cm" svg:y="0.628cm" presentation:class="title" presentation:user-transformed="true">
-          <draw:text-box>
-            <text:p text:style-name="P1">
-              <text:span text:style-name="T1">Step 1: Login to Freshdesk</text:span>
-            </text:p>
-          </draw:text-box>
-        </draw:frame>
-        <draw:frame draw:style-name="gr1" draw:text-style-name="P3" draw:layer="layout" svg:width="14.68cm" svg:height="11.611cm" svg:x="7.319cm" svg:y="3.257cm">
-          <draw:image xlink:href="Pictures/100002010000022B000001B75C1F7168.png" xlink:type="simple" xlink:show="embed" xlink:actuate="onLoad">
-            <text:p/>
-          </draw:image>
-        </draw:frame>
-        <presentation:notes draw:style-name="dp2">
-          <draw:page-thumbnail draw:style-name="gr2" draw:layer="layout" svg:width="18.623cm" svg:height="10.476cm" svg:x="1.483cm" svg:y="2.123cm" draw:page-number="4" presentation:class="page"/>
-          <draw:frame presentation:style-name="pr5" draw:layer="layout" svg:width="17.271cm" svg:height="12.572cm" svg:x="2.159cm" svg:y="13.271cm" presentation:class="notes" presentation:placeholder="true">
-            <draw:text-box/>
-          </draw:frame>
-        </presentation:notes>
-      </draw:page>
-      <draw:page draw:name="Step 2: Navigate to Tickets" draw:style-name="dp1" draw:master-page-name="Default_20_1" presentation:presentation-page-layout-name="AL2T11">
-        <draw:frame draw:name="PlaceHolder 1" presentation:style-name="pr3" draw:text-style-name="P2" draw:layer="layout" svg:width="25.198cm" svg:height="2.628cm" svg:x="1.4cm" svg:y="0.628cm" presentation:class="title" presentation:user-transformed="true">
-          <draw:text-box>
-            <text:p text:style-name="P1">
-              <text:span text:style-name="T1">Step 2: Navigate to Tickets</text:span>
-            </text:p>
-          </draw:text-box>
-        </draw:frame>
-        <draw:frame draw:style-name="gr1" draw:text-style-name="P3" draw:layer="layout" svg:width="10.999cm" svg:height="10.977cm" svg:x="9cm" svg:y="4cm">
-          <draw:image xlink:href="Pictures/10000201000001F0000001EF8766744C.png" xlink:type="simple" xlink:show="embed" xlink:actuate="onLoad">
-            <text:p/>
-          </draw:image>
-        </draw:frame>
         <presentation:notes draw:style-name="dp2">
           <draw:page-thumbnail draw:style-name="gr2" draw:layer="layout" svg:width="18.623cm" svg:height="10.476cm" svg:x="1.483cm" svg:y="2.123cm" draw:page-number="5" presentation:class="page"/>
           <draw:frame presentation:style-name="pr5" draw:layer="layout" svg:width="17.271cm" svg:height="12.572cm" svg:x="2.159cm" svg:y="13.271cm" presentation:class="notes" presentation:placeholder="true">
@@ -373,16 +500,17 @@
           </draw:frame>
         </presentation:notes>
       </draw:page>
-      <draw:page draw:name="Step 3: Create a New Ticket" draw:style-name="dp1" draw:master-page-name="Default_20_1" presentation:presentation-page-layout-name="AL2T11">
+      <draw:page draw:name="Step 1: Login to Freshdesk" draw:style-name="dp1" draw:master-page-name="Default_20_1" presentation:presentation-page-layout-name="AL2T11">
+        <office:forms form:automatic-focus="false" form:apply-design-mode="false"/>
         <draw:frame draw:name="PlaceHolder 1" presentation:style-name="pr3" draw:text-style-name="P2" draw:layer="layout" svg:width="25.198cm" svg:height="2.628cm" svg:x="1.4cm" svg:y="0.628cm" presentation:class="title" presentation:user-transformed="true">
           <draw:text-box>
             <text:p text:style-name="P1">
-              <text:span text:style-name="T1">Step 3: Create a New Ticket</text:span>
-            </text:p>
-          </draw:text-box>
-        </draw:frame>
-        <draw:frame draw:style-name="gr1" draw:text-style-name="P3" draw:layer="layout" svg:width="17.666cm" svg:height="8.51cm" svg:x="5.333cm" svg:y="4.489cm">
-          <draw:image xlink:href="Pictures/1000020100000414000001F7A70E363F.png" xlink:type="simple" xlink:show="embed" xlink:actuate="onLoad">
+              <text:span text:style-name="T1">Step 1: Login to Freshdesk</text:span>
+            </text:p>
+          </draw:text-box>
+        </draw:frame>
+        <draw:frame draw:style-name="gr1" draw:text-style-name="P3" draw:layer="layout" svg:width="14.68cm" svg:height="11.611cm" svg:x="7.319cm" svg:y="3.257cm">
+          <draw:image xlink:href="Pictures/100002010000022B000001B75C1F7168.png" xlink:type="simple" xlink:show="embed" xlink:actuate="onLoad">
             <text:p/>
           </draw:image>
         </draw:frame>
@@ -393,16 +521,17 @@
           </draw:frame>
         </presentation:notes>
       </draw:page>
-      <draw:page draw:name="Step 4: Enter Ticket Details" draw:style-name="dp1" draw:master-page-name="Default_20_1" presentation:presentation-page-layout-name="AL2T11">
+      <draw:page draw:name="Step 2: Navigate to Tickets" draw:style-name="dp1" draw:master-page-name="Default_20_1" presentation:presentation-page-layout-name="AL2T11">
+        <office:forms form:automatic-focus="false" form:apply-design-mode="false"/>
         <draw:frame draw:name="PlaceHolder 1" presentation:style-name="pr3" draw:text-style-name="P2" draw:layer="layout" svg:width="25.198cm" svg:height="2.628cm" svg:x="1.4cm" svg:y="0.628cm" presentation:class="title" presentation:user-transformed="true">
           <draw:text-box>
             <text:p text:style-name="P1">
-              <text:span text:style-name="T1">Step 4: Enter Ticket Details</text:span>
-            </text:p>
-          </draw:text-box>
-        </draw:frame>
-        <draw:frame draw:style-name="gr1" draw:text-style-name="P3" draw:layer="layout" svg:width="20.432cm" svg:height="10.381cm" svg:x="4cm" svg:y="4cm">
-          <draw:image xlink:href="Pictures/10000201000004150000021357E37203.png" xlink:type="simple" xlink:show="embed" xlink:actuate="onLoad">
+              <text:span text:style-name="T1">Step 2: Navigate to Tickets</text:span>
+            </text:p>
+          </draw:text-box>
+        </draw:frame>
+        <draw:frame draw:style-name="gr1" draw:text-style-name="P3" draw:layer="layout" svg:width="10.999cm" svg:height="10.977cm" svg:x="9cm" svg:y="4cm">
+          <draw:image xlink:href="Pictures/10000201000001F0000001EF8766744C.png" xlink:type="simple" xlink:show="embed" xlink:actuate="onLoad">
             <text:p/>
           </draw:image>
         </draw:frame>
@@ -413,7 +542,50 @@
           </draw:frame>
         </presentation:notes>
       </draw:page>
+      <draw:page draw:name="Step 3: Create a New Ticket" draw:style-name="dp1" draw:master-page-name="Default_20_1" presentation:presentation-page-layout-name="AL2T11">
+        <office:forms form:automatic-focus="false" form:apply-design-mode="false"/>
+        <draw:frame draw:name="PlaceHolder 1" presentation:style-name="pr3" draw:text-style-name="P2" draw:layer="layout" svg:width="25.198cm" svg:height="2.628cm" svg:x="1.4cm" svg:y="0.628cm" presentation:class="title" presentation:user-transformed="true">
+          <draw:text-box>
+            <text:p text:style-name="P1">
+              <text:span text:style-name="T1">Step 3: Create a New Ticket</text:span>
+            </text:p>
+          </draw:text-box>
+        </draw:frame>
+        <draw:frame draw:style-name="gr1" draw:text-style-name="P3" draw:layer="layout" svg:width="17.666cm" svg:height="8.51cm" svg:x="5.333cm" svg:y="4.489cm">
+          <draw:image xlink:href="Pictures/1000020100000414000001F7A70E363F.png" xlink:type="simple" xlink:show="embed" xlink:actuate="onLoad">
+            <text:p/>
+          </draw:image>
+        </draw:frame>
+        <presentation:notes draw:style-name="dp2">
+          <draw:page-thumbnail draw:style-name="gr2" draw:layer="layout" svg:width="18.623cm" svg:height="10.476cm" svg:x="1.483cm" svg:y="2.123cm" draw:page-number="8" presentation:class="page"/>
+          <draw:frame presentation:style-name="pr5" draw:layer="layout" svg:width="17.271cm" svg:height="12.572cm" svg:x="2.159cm" svg:y="13.271cm" presentation:class="notes" presentation:placeholder="true">
+            <draw:text-box/>
+          </draw:frame>
+        </presentation:notes>
+      </draw:page>
       <draw:page draw:name="Step 4: Enter Ticket Details" draw:style-name="dp1" draw:master-page-name="Default_20_1" presentation:presentation-page-layout-name="AL2T11">
+        <office:forms form:automatic-focus="false" form:apply-design-mode="false"/>
+        <draw:frame draw:name="PlaceHolder 1" presentation:style-name="pr3" draw:text-style-name="P2" draw:layer="layout" svg:width="25.198cm" svg:height="2.628cm" svg:x="1.4cm" svg:y="0.628cm" presentation:class="title" presentation:user-transformed="true">
+          <draw:text-box>
+            <text:p text:style-name="P1">
+              <text:span text:style-name="T1">Step 4: Enter Ticket Details</text:span>
+            </text:p>
+          </draw:text-box>
+        </draw:frame>
+        <draw:frame draw:style-name="gr1" draw:text-style-name="P3" draw:layer="layout" svg:width="20.432cm" svg:height="10.381cm" svg:x="4cm" svg:y="4cm">
+          <draw:image xlink:href="Pictures/10000201000004150000021357E37203.png" xlink:type="simple" xlink:show="embed" xlink:actuate="onLoad">
+            <text:p/>
+          </draw:image>
+        </draw:frame>
+        <presentation:notes draw:style-name="dp2">
+          <draw:page-thumbnail draw:style-name="gr2" draw:layer="layout" svg:width="18.623cm" svg:height="10.476cm" svg:x="1.483cm" svg:y="2.123cm" draw:page-number="9" presentation:class="page"/>
+          <draw:frame presentation:style-name="pr5" draw:layer="layout" svg:width="17.271cm" svg:height="12.572cm" svg:x="2.159cm" svg:y="13.271cm" presentation:class="notes" presentation:placeholder="true">
+            <draw:text-box/>
+          </draw:frame>
+        </presentation:notes>
+      </draw:page>
+      <draw:page draw:name="Step 4: Enter Ticket Details" draw:style-name="dp1" draw:master-page-name="Default_20_1" presentation:presentation-page-layout-name="AL2T11">
+        <office:forms form:automatic-focus="false" form:apply-design-mode="false"/>
         <draw:frame draw:name="PlaceHolder 1" presentation:style-name="pr3" draw:text-style-name="P2" draw:layer="layout" svg:width="25.198cm" svg:height="2.628cm" svg:x="1.4cm" svg:y="0.628cm" presentation:class="title" presentation:user-transformed="true">
           <draw:text-box>
             <text:p text:style-name="P1">
@@ -448,13 +620,14 @@
           </draw:text-box>
         </draw:frame>
         <presentation:notes draw:style-name="dp2">
-          <draw:page-thumbnail draw:style-name="gr2" draw:layer="layout" svg:width="18.623cm" svg:height="10.476cm" svg:x="1.483cm" svg:y="2.123cm" draw:page-number="8" presentation:class="page"/>
+          <draw:page-thumbnail draw:style-name="gr2" draw:layer="layout" svg:width="18.623cm" svg:height="10.476cm" svg:x="1.483cm" svg:y="2.123cm" draw:page-number="10" presentation:class="page"/>
           <draw:frame presentation:style-name="pr5" draw:layer="layout" svg:width="17.271cm" svg:height="12.572cm" svg:x="2.159cm" svg:y="13.271cm" presentation:class="notes" presentation:placeholder="true">
             <draw:text-box/>
           </draw:frame>
         </presentation:notes>
       </draw:page>
       <draw:page draw:name="Step 5: Assign Agent" draw:style-name="dp1" draw:master-page-name="Default_20_1" presentation:presentation-page-layout-name="AL2T11">
+        <office:forms form:automatic-focus="false" form:apply-design-mode="false"/>
         <draw:frame draw:name="PlaceHolder 1" presentation:style-name="pr3" draw:text-style-name="P2" draw:layer="layout" svg:width="25.198cm" svg:height="2.628cm" svg:x="1.4cm" svg:y="0.628cm" presentation:class="title" presentation:user-transformed="true">
           <draw:text-box>
             <text:p text:style-name="P1">
@@ -464,46 +637,6 @@
         </draw:frame>
         <draw:frame draw:style-name="gr1" draw:text-style-name="P3" draw:layer="layout" svg:width="20.415cm" svg:height="10.275cm" svg:x="4.5cm" svg:y="3.724cm">
           <draw:image xlink:href="Pictures/100002010000040F0000020BDBF8AB11.png" xlink:type="simple" xlink:show="embed" xlink:actuate="onLoad">
-            <text:p/>
-          </draw:image>
-        </draw:frame>
-        <presentation:notes draw:style-name="dp2">
-          <draw:page-thumbnail draw:style-name="gr2" draw:layer="layout" svg:width="18.623cm" svg:height="10.476cm" svg:x="1.483cm" svg:y="2.123cm" draw:page-number="9" presentation:class="page"/>
-          <draw:frame presentation:style-name="pr5" draw:layer="layout" svg:width="17.271cm" svg:height="12.572cm" svg:x="2.159cm" svg:y="13.271cm" presentation:class="notes" presentation:placeholder="true">
-            <draw:text-box/>
-          </draw:frame>
-        </presentation:notes>
-      </draw:page>
-      <draw:page draw:name="Step 6: Submit Ticket" draw:style-name="dp1" draw:master-page-name="Default_20_1" presentation:presentation-page-layout-name="AL2T11">
-        <draw:frame draw:name="PlaceHolder 1" presentation:style-name="pr3" draw:text-style-name="P2" draw:layer="layout" svg:width="25.198cm" svg:height="2.628cm" svg:x="1.4cm" svg:y="0.628cm" presentation:class="title" presentation:user-transformed="true">
-          <draw:text-box>
-            <text:p text:style-name="P1">
-              <text:span text:style-name="T1">Step 6: Submit Ticket</text:span>
-            </text:p>
-          </draw:text-box>
-        </draw:frame>
-        <draw:frame draw:style-name="gr1" draw:text-style-name="P3" draw:layer="layout" svg:width="20.577cm" svg:height="10.169cm" svg:x="4.5cm" svg:y="4cm">
-          <draw:image xlink:href="Pictures/1000020100000412000002036469BF3F.png" xlink:type="simple" xlink:show="embed" xlink:actuate="onLoad">
-            <text:p/>
-          </draw:image>
-        </draw:frame>
-        <presentation:notes draw:style-name="dp2">
-          <draw:page-thumbnail draw:style-name="gr2" draw:layer="layout" svg:width="18.623cm" svg:height="10.476cm" svg:x="1.483cm" svg:y="2.123cm" draw:page-number="10" presentation:class="page"/>
-          <draw:frame presentation:style-name="pr5" draw:layer="layout" svg:width="17.271cm" svg:height="12.572cm" svg:x="2.159cm" svg:y="13.271cm" presentation:class="notes" presentation:placeholder="true">
-            <draw:text-box/>
-          </draw:frame>
-        </presentation:notes>
-      </draw:page>
-      <draw:page draw:name="Step 7: Confirmation and Tracking" draw:style-name="dp1" draw:master-page-name="Default_20_1" presentation:presentation-page-layout-name="AL2T11">
-        <draw:frame draw:name="PlaceHolder 1" presentation:style-name="pr3" draw:text-style-name="P2" draw:layer="layout" svg:width="25.198cm" svg:height="2.628cm" svg:x="1.4cm" svg:y="0.628cm" presentation:class="title" presentation:user-transformed="true">
-          <draw:text-box>
-            <text:p text:style-name="P1">
-              <text:span text:style-name="T1">Step 7: Confirmation and Tracking</text:span>
-            </text:p>
-          </draw:text-box>
-        </draw:frame>
-        <draw:frame draw:style-name="gr1" draw:text-style-name="P3" draw:layer="layout" svg:width="21.079cm" svg:height="10.987cm" svg:x="3.5cm" svg:y="3.512cm">
-          <draw:image xlink:href="Pictures/100002010000040A0000021B4B104129.png" xlink:type="simple" xlink:show="embed" xlink:actuate="onLoad">
             <text:p/>
           </draw:image>
         </draw:frame>
@@ -514,16 +647,17 @@
           </draw:frame>
         </presentation:notes>
       </draw:page>
-      <draw:page draw:name="Step 8: Agent Follow-Up" draw:style-name="dp1" draw:master-page-name="Default_20_1" presentation:presentation-page-layout-name="AL2T11">
+      <draw:page draw:name="Step 6: Submit Ticket" draw:style-name="dp1" draw:master-page-name="Default_20_1" presentation:presentation-page-layout-name="AL2T11">
+        <office:forms form:automatic-focus="false" form:apply-design-mode="false"/>
         <draw:frame draw:name="PlaceHolder 1" presentation:style-name="pr3" draw:text-style-name="P2" draw:layer="layout" svg:width="25.198cm" svg:height="2.628cm" svg:x="1.4cm" svg:y="0.628cm" presentation:class="title" presentation:user-transformed="true">
           <draw:text-box>
             <text:p text:style-name="P1">
-              <text:span text:style-name="T1">Step 8: Agent Follow-Up</text:span>
-            </text:p>
-          </draw:text-box>
-        </draw:frame>
-        <draw:frame draw:style-name="gr1" draw:text-style-name="P3" draw:layer="layout" svg:width="7.785cm" svg:height="11.489cm" svg:x="10.214cm" svg:y="3.257cm">
-          <draw:image xlink:href="Pictures/100000000000015F00000206306D6755.jpg" xlink:type="simple" xlink:show="embed" xlink:actuate="onLoad">
+              <text:span text:style-name="T1">Step 6: Submit Ticket</text:span>
+            </text:p>
+          </draw:text-box>
+        </draw:frame>
+        <draw:frame draw:style-name="gr1" draw:text-style-name="P3" draw:layer="layout" svg:width="20.577cm" svg:height="10.169cm" svg:x="4.5cm" svg:y="4cm">
+          <draw:image xlink:href="Pictures/1000020100000412000002036469BF3F.png" xlink:type="simple" xlink:show="embed" xlink:actuate="onLoad">
             <text:p/>
           </draw:image>
         </draw:frame>
@@ -534,16 +668,17 @@
           </draw:frame>
         </presentation:notes>
       </draw:page>
-      <draw:page draw:name="Step 9: Resolution and Closure" draw:style-name="dp1" draw:master-page-name="Default_20_1" presentation:presentation-page-layout-name="AL2T11">
+      <draw:page draw:name="Step 7: Confirmation and Tracking" draw:style-name="dp1" draw:master-page-name="Default_20_1" presentation:presentation-page-layout-name="AL2T11">
+        <office:forms form:automatic-focus="false" form:apply-design-mode="false"/>
         <draw:frame draw:name="PlaceHolder 1" presentation:style-name="pr3" draw:text-style-name="P2" draw:layer="layout" svg:width="25.198cm" svg:height="2.628cm" svg:x="1.4cm" svg:y="0.628cm" presentation:class="title" presentation:user-transformed="true">
           <draw:text-box>
             <text:p text:style-name="P1">
-              <text:span text:style-name="T1">Step 9: Resolution and Closure</text:span>
-            </text:p>
-          </draw:text-box>
-        </draw:frame>
-        <draw:frame draw:style-name="gr1" draw:text-style-name="P3" draw:layer="layout" svg:width="20.366cm" svg:height="10.743cm" svg:x="5cm" svg:y="3.257cm">
-          <draw:image xlink:href="Pictures/100002010000042F000002354A2D87F6.png" xlink:type="simple" xlink:show="embed" xlink:actuate="onLoad">
+              <text:span text:style-name="T1">Step 7: Confirmation and Tracking</text:span>
+            </text:p>
+          </draw:text-box>
+        </draw:frame>
+        <draw:frame draw:style-name="gr1" draw:text-style-name="P3" draw:layer="layout" svg:width="21.079cm" svg:height="10.987cm" svg:x="3.5cm" svg:y="3.512cm">
+          <draw:image xlink:href="Pictures/100002010000040A0000021B4B104129.png" xlink:type="simple" xlink:show="embed" xlink:actuate="onLoad">
             <text:p/>
           </draw:image>
         </draw:frame>
@@ -554,16 +689,17 @@
           </draw:frame>
         </presentation:notes>
       </draw:page>
-      <draw:page draw:name="Step 9: Resolution and Closure" draw:style-name="dp1" draw:master-page-name="Default_20_1" presentation:presentation-page-layout-name="AL2T11">
+      <draw:page draw:name="Step 8: Agent Follow-Up" draw:style-name="dp1" draw:master-page-name="Default_20_1" presentation:presentation-page-layout-name="AL2T11">
+        <office:forms form:automatic-focus="false" form:apply-design-mode="false"/>
         <draw:frame draw:name="PlaceHolder 1" presentation:style-name="pr3" draw:text-style-name="P2" draw:layer="layout" svg:width="25.198cm" svg:height="2.628cm" svg:x="1.4cm" svg:y="0.628cm" presentation:class="title" presentation:user-transformed="true">
           <draw:text-box>
             <text:p text:style-name="P1">
-              <text:span text:style-name="T1">Step 9: Resolution and Closure</text:span>
-            </text:p>
-          </draw:text-box>
-        </draw:frame>
-        <draw:frame draw:style-name="gr1" draw:text-style-name="P3" draw:layer="layout" svg:width="18.848cm" svg:height="10.782cm" svg:x="5.151cm" svg:y="3.257cm">
-          <draw:image xlink:href="Pictures/10000201000004170000025782C134F4.png" xlink:type="simple" xlink:show="embed" xlink:actuate="onLoad">
+              <text:span text:style-name="T1">Step 8: Agent Follow-Up</text:span>
+            </text:p>
+          </draw:text-box>
+        </draw:frame>
+        <draw:frame draw:style-name="gr1" draw:text-style-name="P3" draw:layer="layout" svg:width="7.785cm" svg:height="11.489cm" svg:x="10.214cm" svg:y="3.257cm">
+          <draw:image xlink:href="Pictures/100000000000015F00000206306D6755.jpg" xlink:type="simple" xlink:show="embed" xlink:actuate="onLoad">
             <text:p/>
           </draw:image>
         </draw:frame>
@@ -574,9 +710,17 @@
           </draw:frame>
         </presentation:notes>
       </draw:page>
-      <draw:page draw:name="page15" draw:style-name="dp1" draw:master-page-name="Default_20_1" presentation:presentation-page-layout-name="AL2T11">
-        <draw:frame draw:style-name="gr3" draw:text-style-name="P1" draw:layer="layout" svg:width="7.893cm" svg:height="15.212cm" svg:x="10.107cm" svg:y="0cm">
-          <draw:image xlink:href="Pictures/100000000000028B000004E2BC02E1DA.jpg" xlink:type="simple" xlink:show="embed" xlink:actuate="onLoad">
+      <draw:page draw:name="Step 9: Resolution and Closure" draw:style-name="dp1" draw:master-page-name="Default_20_1" presentation:presentation-page-layout-name="AL2T11">
+        <office:forms form:automatic-focus="false" form:apply-design-mode="false"/>
+        <draw:frame draw:name="PlaceHolder 1" presentation:style-name="pr3" draw:text-style-name="P2" draw:layer="layout" svg:width="25.198cm" svg:height="2.628cm" svg:x="1.4cm" svg:y="0.628cm" presentation:class="title" presentation:user-transformed="true">
+          <draw:text-box>
+            <text:p text:style-name="P1">
+              <text:span text:style-name="T1">Step 9: Resolution and Closure</text:span>
+            </text:p>
+          </draw:text-box>
+        </draw:frame>
+        <draw:frame draw:style-name="gr1" draw:text-style-name="P3" draw:layer="layout" svg:width="20.366cm" svg:height="10.743cm" svg:x="5cm" svg:y="3.257cm">
+          <draw:image xlink:href="Pictures/100002010000042F000002354A2D87F6.png" xlink:type="simple" xlink:show="embed" xlink:actuate="onLoad">
             <text:p/>
           </draw:image>
         </draw:frame>
@@ -587,7 +731,42 @@
           </draw:frame>
         </presentation:notes>
       </draw:page>
-      <draw:page draw:name="page16" draw:style-name="dp1" draw:master-page-name="Default_20_1" presentation:presentation-page-layout-name="AL2T11">
+      <draw:page draw:name="Step 9: Resolution and Closure" draw:style-name="dp1" draw:master-page-name="Default_20_1" presentation:presentation-page-layout-name="AL2T11">
+        <office:forms form:automatic-focus="false" form:apply-design-mode="false"/>
+        <draw:frame draw:name="PlaceHolder 1" presentation:style-name="pr3" draw:text-style-name="P2" draw:layer="layout" svg:width="25.198cm" svg:height="2.628cm" svg:x="1.4cm" svg:y="0.628cm" presentation:class="title" presentation:user-transformed="true">
+          <draw:text-box>
+            <text:p text:style-name="P1">
+              <text:span text:style-name="T1">Step 9: Resolution and Closure</text:span>
+            </text:p>
+          </draw:text-box>
+        </draw:frame>
+        <draw:frame draw:style-name="gr1" draw:text-style-name="P3" draw:layer="layout" svg:width="18.848cm" svg:height="10.782cm" svg:x="5.151cm" svg:y="3.257cm">
+          <draw:image xlink:href="Pictures/10000201000004170000025782C134F4.png" xlink:type="simple" xlink:show="embed" xlink:actuate="onLoad">
+            <text:p/>
+          </draw:image>
+        </draw:frame>
+        <presentation:notes draw:style-name="dp2">
+          <draw:page-thumbnail draw:style-name="gr2" draw:layer="layout" svg:width="18.623cm" svg:height="10.476cm" svg:x="1.483cm" svg:y="2.123cm" draw:page-number="16" presentation:class="page"/>
+          <draw:frame presentation:style-name="pr5" draw:layer="layout" svg:width="17.271cm" svg:height="12.572cm" svg:x="2.159cm" svg:y="13.271cm" presentation:class="notes" presentation:placeholder="true">
+            <draw:text-box/>
+          </draw:frame>
+        </presentation:notes>
+      </draw:page>
+      <draw:page draw:name="page17" draw:style-name="dp1" draw:master-page-name="Default_20_1" presentation:presentation-page-layout-name="AL2T11">
+        <office:forms form:automatic-focus="false" form:apply-design-mode="false"/>
+        <draw:frame draw:style-name="gr3" draw:text-style-name="P1" draw:layer="layout" svg:width="7.893cm" svg:height="15.212cm" svg:x="10.107cm" svg:y="0cm">
+          <draw:image xlink:href="Pictures/100000000000028B000004E2BC02E1DA.jpg" xlink:type="simple" xlink:show="embed" xlink:actuate="onLoad">
+            <text:p/>
+          </draw:image>
+        </draw:frame>
+        <presentation:notes draw:style-name="dp2">
+          <draw:page-thumbnail draw:style-name="gr2" draw:layer="layout" svg:width="18.623cm" svg:height="10.476cm" svg:x="1.483cm" svg:y="2.123cm" draw:page-number="17" presentation:class="page"/>
+          <draw:frame presentation:style-name="pr5" draw:layer="layout" svg:width="17.271cm" svg:height="12.572cm" svg:x="2.159cm" svg:y="13.271cm" presentation:class="notes" presentation:placeholder="true">
+            <draw:text-box/>
+          </draw:frame>
+        </presentation:notes>
+      </draw:page>
+      <draw:page draw:name="page18" draw:style-name="dp1" draw:master-page-name="Default_20_1" presentation:presentation-page-layout-name="AL2T11">
         <office:forms form:automatic-focus="false" form:apply-design-mode="false"/>
         <draw:frame draw:style-name="gr3" draw:text-style-name="P1" draw:layer="layout" svg:width="16.2cm" svg:height="13.151cm" svg:x="12.2cm" svg:y="0.8cm">
           <draw:image xlink:href="Pictures/1000000000000286000001FB2DDFD6D6.jpg" xlink:type="simple" xlink:show="embed" xlink:actuate="onLoad">
@@ -600,7 +779,7 @@
           </draw:image>
         </draw:frame>
         <presentation:notes draw:style-name="dp2">
-          <draw:page-thumbnail draw:style-name="gr2" draw:layer="layout" svg:width="18.623cm" svg:height="10.476cm" svg:x="1.483cm" svg:y="2.123cm" draw:page-number="16" presentation:class="page"/>
+          <draw:page-thumbnail draw:style-name="gr2" draw:layer="layout" svg:width="18.623cm" svg:height="10.476cm" svg:x="1.483cm" svg:y="2.123cm" draw:page-number="18" presentation:class="page"/>
           <draw:frame presentation:style-name="pr5" draw:text-style-name="P5" draw:layer="layout" svg:width="17.271cm" svg:height="12.572cm" svg:x="2.159cm" svg:y="13.271cm" presentation:class="notes" presentation:placeholder="true">
             <draw:text-box/>
           </draw:frame>
@@ -615,10 +794,12 @@
 <file path=meta.xml><?xml version="1.0" encoding="utf-8"?>
 <office:document-meta xmlns:office="urn:oasis:names:tc:opendocument:xmlns:office:1.0" xmlns:xlink="http://www.w3.org/1999/xlink" xmlns:dc="http://purl.org/dc/elements/1.1/" xmlns:meta="urn:oasis:names:tc:opendocument:xmlns:meta:1.0" xmlns:presentation="urn:oasis:names:tc:opendocument:xmlns:presentation:1.0" xmlns:ooo="http://openoffice.org/2004/office" xmlns:smil="urn:oasis:names:tc:opendocument:xmlns:smil-compatible:1.0" xmlns:anim="urn:oasis:names:tc:opendocument:xmlns:animation:1.0" xmlns:grddl="http://www.w3.org/2003/g/data-view#" xmlns:officeooo="http://openoffice.org/2009/office" xmlns:drawooo="http://openoffice.org/2010/draw" office:version="1.2">
   <office:meta>
-    <dc:date>2024-02-18T16:19:08.25</dc:date>
+    <dc:date>2024-02-19T19:20:39</dc:date>
     <dc:creator>G L</dc:creator>
-    <meta:document-statistic meta:object-count="89"/>
     <meta:generator>OpenOffice/4.1.10$Win32 OpenOffice.org_project/4110m2$Build-9807</meta:generator>
+    <meta:editing-duration>PT8M42S</meta:editing-duration>
+    <meta:editing-cycles>2</meta:editing-cycles>
+    <meta:document-statistic meta:object-count="97"/>
   </office:meta>
 </office:document-meta>
 </file>
@@ -627,10 +808,10 @@
 <office:document-settings xmlns:office="urn:oasis:names:tc:opendocument:xmlns:office:1.0" xmlns:xlink="http://www.w3.org/1999/xlink" xmlns:presentation="urn:oasis:names:tc:opendocument:xmlns:presentation:1.0" xmlns:config="urn:oasis:names:tc:opendocument:xmlns:config:1.0" xmlns:ooo="http://openoffice.org/2004/office" xmlns:smil="urn:oasis:names:tc:opendocument:xmlns:smil-compatible:1.0" xmlns:anim="urn:oasis:names:tc:opendocument:xmlns:animation:1.0" xmlns:officeooo="http://openoffice.org/2009/office" xmlns:drawooo="http://openoffice.org/2010/draw" office:version="1.2">
   <office:settings>
     <config:config-item-set config:name="ooo:view-settings">
-      <config:config-item config:name="VisibleAreaTop" config:type="int">-1461</config:config-item>
-      <config:config-item config:name="VisibleAreaLeft" config:type="int">-6911</config:config-item>
-      <config:config-item config:name="VisibleAreaWidth" config:type="int">42136</config:config-item>
-      <config:config-item config:name="VisibleAreaHeight" config:type="int">18797</config:config-item>
+      <config:config-item config:name="VisibleAreaTop" config:type="int">-5709</config:config-item>
+      <config:config-item config:name="VisibleAreaLeft" config:type="int">-8460</config:config-item>
+      <config:config-item config:name="VisibleAreaWidth" config:type="int">37146</config:config-item>
+      <config:config-item config:name="VisibleAreaHeight" config:type="int">16571</config:config-item>
       <config:config-item-map-indexed config:name="Views">
         <config:config-item-map-entry>
           <config:config-item config:name="ViewId" config:type="string">view1</config:config-item>
@@ -652,7 +833,7 @@
           <config:config-item config:name="NoColors" config:type="boolean">true</config:config-item>
           <config:config-item config:name="RulerIsVisible" config:type="boolean">false</config:config-item>
           <config:config-item config:name="PageKind" config:type="short">0</config:config-item>
-          <config:config-item config:name="SelectedPage" config:type="short">15</config:config-item>
+          <config:config-item config:name="SelectedPage" config:type="short">0</config:config-item>
           <config:config-item config:name="IsLayerMode" config:type="boolean">false</config:config-item>
           <config:config-item config:name="IsBigHandles" config:type="boolean">true</config:config-item>
           <config:config-item config:name="IsDoubleClickTextEdit" config:type="boolean">true</config:config-item>
@@ -661,10 +842,10 @@
           <config:config-item config:name="EditModeStandard" config:type="int">0</config:config-item>
           <config:config-item config:name="EditModeNotes" config:type="int">0</config:config-item>
           <config:config-item config:name="EditModeHandout" config:type="int">1</config:config-item>
-          <config:config-item config:name="VisibleAreaTop" config:type="int">-1461</config:config-item>
-          <config:config-item config:name="VisibleAreaLeft" config:type="int">-6911</config:config-item>
-          <config:config-item config:name="VisibleAreaWidth" config:type="int">42137</config:config-item>
-          <config:config-item config:name="VisibleAreaHeight" config:type="int">18798</config:config-item>
+          <config:config-item config:name="VisibleAreaTop" config:type="int">-5709</config:config-item>
+          <config:config-item config:name="VisibleAreaLeft" config:type="int">-8460</config:config-item>
+          <config:config-item config:name="VisibleAreaWidth" config:type="int">37147</config:config-item>
+          <config:config-item config:name="VisibleAreaHeight" config:type="int">16572</config:config-item>
           <config:config-item config:name="GridCoarseWidth" config:type="int">2000</config:config-item>
           <config:config-item config:name="GridCoarseHeight" config:type="int">2000</config:config-item>
           <config:config-item config:name="GridFineWidth" config:type="int">200</config:config-item>
@@ -686,6 +867,15 @@
       <config:config-item config:name="ColorTableURL" config:type="string">$(user)/config/standard.soc</config:config-item>
       <config:config-item config:name="DashTableURL" config:type="string">$(user)/config/standard.sod</config:config-item>
       <config:config-item config:name="DefaultTabStop" config:type="int">1250</config:config-item>
+      <config:config-item-map-indexed config:name="ForbiddenCharacters">
+        <config:config-item-map-entry>
+          <config:config-item config:name="Language" config:type="string">en</config:config-item>
+          <config:config-item config:name="Country" config:type="string">CA</config:config-item>
+          <config:config-item config:name="Variant" config:type="string"/>
+          <config:config-item config:name="BeginLine" config:type="string"/>
+          <config:config-item config:name="EndLine" config:type="string"/>
+        </config:config-item-map-entry>
+      </config:config-item-map-indexed>
       <config:config-item config:name="GradientTableURL" config:type="string">$(user)/config/standard.sog</config:config-item>
       <config:config-item config:name="HandoutsHorizontal" config:type="boolean">true</config:config-item>
       <config:config-item config:name="HatchTableURL" config:type="string">$(user)/config/standard.soh</config:config-item>
@@ -838,6 +1028,481 @@
       <style:graphic-properties draw:stroke="solid" svg:stroke-color="#000000" draw:marker-start="Arrow" draw:marker-start-width="0.2cm" draw:marker-end="Arrow" draw:marker-end-width="0.2cm" draw:fill="none" draw:show-unit="true"/>
       <style:text-properties fo:font-size="12pt"/>
     </style:style>
+    <style:style style:name="Normal" style:family="graphic">
+      <style:paragraph-properties fo:margin-top="0cm" fo:margin-bottom="0.497cm" fo:line-height="108%" fo:text-align="start" style:text-autospace="none" style:writing-mode="lr-tb"/>
+      <style:text-properties style:use-window-font-color="true" fo:font-family="Calibri" style:font-family-generic="roman" style:font-pitch="variable" fo:font-size="11pt" fo:language="en" fo:country="US" style:letter-kerning="false" style:font-family-asian="Calibri" style:font-family-generic-asian="swiss" style:font-pitch-asian="variable" style:font-size-asian="11pt" style:language-asian="en" style:country-asian="US" style:font-family-complex="Calibri" style:font-family-generic-complex="roman" style:font-pitch-complex="variable" style:font-size-complex="11pt" style:language-complex="ar" style:country-complex="SA"/>
+    </style:style>
+    <style:style style:name="ListLabel_20_107" style:display-name="ListLabel 107" style:family="graphic">
+      <style:paragraph-properties style:text-autospace="none"/>
+      <style:text-properties style:font-family-complex="OpenSymbol, 'Arial Unicode MS'" style:font-pitch-complex="variable"/>
+    </style:style>
+    <style:style style:name="ListLabel_20_106" style:display-name="ListLabel 106" style:family="graphic">
+      <style:paragraph-properties style:text-autospace="none"/>
+      <style:text-properties style:font-family-complex="OpenSymbol, 'Arial Unicode MS'" style:font-pitch-complex="variable"/>
+    </style:style>
+    <style:style style:name="ListLabel_20_105" style:display-name="ListLabel 105" style:family="graphic">
+      <style:paragraph-properties style:text-autospace="none"/>
+      <style:text-properties style:font-family-complex="Symbol" style:font-pitch-complex="variable"/>
+    </style:style>
+    <style:style style:name="ListLabel_20_104" style:display-name="ListLabel 104" style:family="graphic">
+      <style:paragraph-properties style:text-autospace="none"/>
+      <style:text-properties style:font-family-complex="OpenSymbol, 'Arial Unicode MS'" style:font-pitch-complex="variable"/>
+    </style:style>
+    <style:style style:name="ListLabel_20_103" style:display-name="ListLabel 103" style:family="graphic">
+      <style:paragraph-properties style:text-autospace="none"/>
+      <style:text-properties style:font-family-complex="OpenSymbol, 'Arial Unicode MS'" style:font-pitch-complex="variable"/>
+    </style:style>
+    <style:style style:name="ListLabel_20_102" style:display-name="ListLabel 102" style:family="graphic">
+      <style:paragraph-properties style:text-autospace="none"/>
+      <style:text-properties style:font-family-complex="Symbol" style:font-pitch-complex="variable"/>
+    </style:style>
+    <style:style style:name="ListLabel_20_101" style:display-name="ListLabel 101" style:family="graphic">
+      <style:paragraph-properties style:text-autospace="none"/>
+      <style:text-properties style:font-family-complex="OpenSymbol, 'Arial Unicode MS'" style:font-pitch-complex="variable"/>
+    </style:style>
+    <style:style style:name="ListLabel_20_100" style:display-name="ListLabel 100" style:family="graphic">
+      <style:paragraph-properties style:text-autospace="none"/>
+      <style:text-properties style:font-family-complex="OpenSymbol, 'Arial Unicode MS'" style:font-pitch-complex="variable"/>
+    </style:style>
+    <style:style style:name="ListLabel_20_99" style:display-name="ListLabel 99" style:family="graphic">
+      <style:paragraph-properties style:text-autospace="none"/>
+      <style:text-properties style:font-family-complex="Symbol" style:font-pitch-complex="variable"/>
+    </style:style>
+    <style:style style:name="ListLabel_20_98" style:display-name="ListLabel 98" style:family="graphic">
+      <style:paragraph-properties style:text-autospace="none"/>
+      <style:text-properties style:font-family-complex="OpenSymbol, 'Arial Unicode MS'" style:font-pitch-complex="variable"/>
+    </style:style>
+    <style:style style:name="ListLabel_20_97" style:display-name="ListLabel 97" style:family="graphic">
+      <style:paragraph-properties style:text-autospace="none"/>
+      <style:text-properties style:font-family-complex="OpenSymbol, 'Arial Unicode MS'" style:font-pitch-complex="variable"/>
+    </style:style>
+    <style:style style:name="ListLabel_20_96" style:display-name="ListLabel 96" style:family="graphic">
+      <style:paragraph-properties style:text-autospace="none"/>
+      <style:text-properties style:font-family-complex="Symbol" style:font-pitch-complex="variable"/>
+    </style:style>
+    <style:style style:name="ListLabel_20_95" style:display-name="ListLabel 95" style:family="graphic">
+      <style:paragraph-properties style:text-autospace="none"/>
+      <style:text-properties style:font-family-complex="OpenSymbol, 'Arial Unicode MS'" style:font-pitch-complex="variable"/>
+    </style:style>
+    <style:style style:name="ListLabel_20_94" style:display-name="ListLabel 94" style:family="graphic">
+      <style:paragraph-properties style:text-autospace="none"/>
+      <style:text-properties style:font-family-complex="OpenSymbol, 'Arial Unicode MS'" style:font-pitch-complex="variable"/>
+    </style:style>
+    <style:style style:name="ListLabel_20_93" style:display-name="ListLabel 93" style:family="graphic">
+      <style:paragraph-properties style:text-autospace="none"/>
+      <style:text-properties style:font-family-complex="Symbol" style:font-pitch-complex="variable"/>
+    </style:style>
+    <style:style style:name="ListLabel_20_92" style:display-name="ListLabel 92" style:family="graphic">
+      <style:paragraph-properties style:text-autospace="none"/>
+      <style:text-properties style:font-family-complex="OpenSymbol, 'Arial Unicode MS'" style:font-pitch-complex="variable"/>
+    </style:style>
+    <style:style style:name="ListLabel_20_91" style:display-name="ListLabel 91" style:family="graphic">
+      <style:paragraph-properties style:text-autospace="none"/>
+      <style:text-properties style:font-family-complex="OpenSymbol, 'Arial Unicode MS'" style:font-pitch-complex="variable"/>
+    </style:style>
+    <style:style style:name="ListLabel_20_90" style:display-name="ListLabel 90" style:family="graphic">
+      <style:paragraph-properties style:text-autospace="none"/>
+      <style:text-properties style:font-family-complex="Symbol" style:font-pitch-complex="variable"/>
+    </style:style>
+    <style:style style:name="ListLabel_20_89" style:display-name="ListLabel 89" style:family="graphic">
+      <style:paragraph-properties style:text-autospace="none"/>
+      <style:text-properties style:font-family-complex="Wingdings" style:font-pitch-complex="variable"/>
+    </style:style>
+    <style:style style:name="ListLabel_20_88" style:display-name="ListLabel 88" style:family="graphic">
+      <style:paragraph-properties style:text-autospace="none"/>
+      <style:text-properties style:font-family-complex="'Courier New'" style:font-family-generic-complex="modern" style:font-pitch-complex="variable"/>
+    </style:style>
+    <style:style style:name="ListLabel_20_87" style:display-name="ListLabel 87" style:family="graphic">
+      <style:paragraph-properties style:text-autospace="none"/>
+      <style:text-properties style:font-family-complex="Symbol" style:font-pitch-complex="variable"/>
+    </style:style>
+    <style:style style:name="ListLabel_20_86" style:display-name="ListLabel 86" style:family="graphic">
+      <style:paragraph-properties style:text-autospace="none"/>
+      <style:text-properties style:font-family-complex="Wingdings" style:font-pitch-complex="variable"/>
+    </style:style>
+    <style:style style:name="ListLabel_20_85" style:display-name="ListLabel 85" style:family="graphic">
+      <style:paragraph-properties style:text-autospace="none"/>
+      <style:text-properties style:font-family-complex="'Courier New'" style:font-family-generic-complex="modern" style:font-pitch-complex="variable"/>
+    </style:style>
+    <style:style style:name="ListLabel_20_84" style:display-name="ListLabel 84" style:family="graphic">
+      <style:paragraph-properties style:text-autospace="none"/>
+      <style:text-properties style:font-family-complex="Symbol" style:font-pitch-complex="variable"/>
+    </style:style>
+    <style:style style:name="ListLabel_20_83" style:display-name="ListLabel 83" style:family="graphic">
+      <style:paragraph-properties style:text-autospace="none"/>
+      <style:text-properties style:font-family-complex="Wingdings" style:font-pitch-complex="variable"/>
+    </style:style>
+    <style:style style:name="ListLabel_20_82" style:display-name="ListLabel 82" style:family="graphic">
+      <style:paragraph-properties style:text-autospace="none"/>
+      <style:text-properties style:font-family-complex="'Courier New'" style:font-family-generic-complex="modern" style:font-pitch-complex="variable"/>
+    </style:style>
+    <style:style style:name="ListLabel_20_81" style:display-name="ListLabel 81" style:family="graphic">
+      <style:paragraph-properties style:text-autospace="none"/>
+      <style:text-properties style:font-family-complex="Symbol" style:font-pitch-complex="variable"/>
+    </style:style>
+    <style:style style:name="ListLabel_20_80" style:display-name="ListLabel 80" style:family="graphic">
+      <style:paragraph-properties style:text-autospace="none"/>
+      <style:text-properties style:font-family-complex="Wingdings" style:font-pitch-complex="variable"/>
+    </style:style>
+    <style:style style:name="ListLabel_20_79" style:display-name="ListLabel 79" style:family="graphic">
+      <style:paragraph-properties style:text-autospace="none"/>
+      <style:text-properties style:font-family-complex="'Courier New'" style:font-family-generic-complex="modern" style:font-pitch-complex="variable"/>
+    </style:style>
+    <style:style style:name="ListLabel_20_78" style:display-name="ListLabel 78" style:family="graphic">
+      <style:paragraph-properties style:text-autospace="none"/>
+      <style:text-properties style:font-family-complex="Symbol" style:font-pitch-complex="variable"/>
+    </style:style>
+    <style:style style:name="ListLabel_20_77" style:display-name="ListLabel 77" style:family="graphic">
+      <style:paragraph-properties style:text-autospace="none"/>
+      <style:text-properties style:font-family-complex="Wingdings" style:font-pitch-complex="variable"/>
+    </style:style>
+    <style:style style:name="ListLabel_20_76" style:display-name="ListLabel 76" style:family="graphic">
+      <style:paragraph-properties style:text-autospace="none"/>
+      <style:text-properties style:font-family-complex="'Courier New'" style:font-family-generic-complex="modern" style:font-pitch-complex="variable"/>
+    </style:style>
+    <style:style style:name="ListLabel_20_75" style:display-name="ListLabel 75" style:family="graphic">
+      <style:paragraph-properties style:text-autospace="none"/>
+      <style:text-properties style:font-family-complex="Symbol" style:font-pitch-complex="variable"/>
+    </style:style>
+    <style:style style:name="ListLabel_20_74" style:display-name="ListLabel 74" style:family="graphic">
+      <style:paragraph-properties style:text-autospace="none"/>
+      <style:text-properties style:font-family-complex="Wingdings" style:font-pitch-complex="variable"/>
+    </style:style>
+    <style:style style:name="ListLabel_20_73" style:display-name="ListLabel 73" style:family="graphic">
+      <style:paragraph-properties style:text-autospace="none"/>
+      <style:text-properties style:font-family-complex="'Courier New'" style:font-family-generic-complex="modern" style:font-pitch-complex="variable"/>
+    </style:style>
+    <style:style style:name="ListLabel_20_72" style:display-name="ListLabel 72" style:family="graphic">
+      <style:paragraph-properties style:text-autospace="none"/>
+      <style:text-properties style:font-family-complex="Symbol" style:font-pitch-complex="variable"/>
+    </style:style>
+    <style:style style:name="ListLabel_20_71" style:display-name="ListLabel 71" style:family="graphic">
+      <style:paragraph-properties style:text-autospace="none"/>
+      <style:text-properties style:font-family-complex="Wingdings" style:font-pitch-complex="variable"/>
+    </style:style>
+    <style:style style:name="ListLabel_20_70" style:display-name="ListLabel 70" style:family="graphic">
+      <style:paragraph-properties style:text-autospace="none"/>
+      <style:text-properties style:font-family-complex="'Courier New'" style:font-family-generic-complex="modern" style:font-pitch-complex="variable"/>
+    </style:style>
+    <style:style style:name="ListLabel_20_69" style:display-name="ListLabel 69" style:family="graphic">
+      <style:paragraph-properties style:text-autospace="none"/>
+      <style:text-properties style:font-family-complex="Symbol" style:font-pitch-complex="variable"/>
+    </style:style>
+    <style:style style:name="ListLabel_20_68" style:display-name="ListLabel 68" style:family="graphic">
+      <style:paragraph-properties style:text-autospace="none"/>
+      <style:text-properties style:font-family-complex="Wingdings" style:font-pitch-complex="variable"/>
+    </style:style>
+    <style:style style:name="ListLabel_20_67" style:display-name="ListLabel 67" style:family="graphic">
+      <style:paragraph-properties style:text-autospace="none"/>
+      <style:text-properties style:font-family-complex="'Courier New'" style:font-family-generic-complex="modern" style:font-pitch-complex="variable"/>
+    </style:style>
+    <style:style style:name="ListLabel_20_66" style:display-name="ListLabel 66" style:family="graphic">
+      <style:paragraph-properties style:text-autospace="none"/>
+      <style:text-properties style:font-family-complex="Symbol" style:font-pitch-complex="variable"/>
+    </style:style>
+    <style:style style:name="ListLabel_20_65" style:display-name="ListLabel 65" style:family="graphic">
+      <style:paragraph-properties style:text-autospace="none"/>
+      <style:text-properties style:font-family-complex="Wingdings" style:font-pitch-complex="variable"/>
+    </style:style>
+    <style:style style:name="ListLabel_20_64" style:display-name="ListLabel 64" style:family="graphic">
+      <style:paragraph-properties style:text-autospace="none"/>
+      <style:text-properties style:font-family-complex="'Courier New'" style:font-family-generic-complex="modern" style:font-pitch-complex="variable"/>
+    </style:style>
+    <style:style style:name="ListLabel_20_63" style:display-name="ListLabel 63" style:family="graphic">
+      <style:paragraph-properties style:text-autospace="none"/>
+      <style:text-properties style:font-family-complex="Symbol" style:font-pitch-complex="variable"/>
+    </style:style>
+    <style:style style:name="ListLabel_20_62" style:display-name="ListLabel 62" style:family="graphic">
+      <style:paragraph-properties style:text-autospace="none"/>
+      <style:text-properties style:font-family-complex="Wingdings" style:font-pitch-complex="variable"/>
+    </style:style>
+    <style:style style:name="ListLabel_20_61" style:display-name="ListLabel 61" style:family="graphic">
+      <style:paragraph-properties style:text-autospace="none"/>
+      <style:text-properties style:font-family-complex="'Courier New'" style:font-family-generic-complex="modern" style:font-pitch-complex="variable"/>
+    </style:style>
+    <style:style style:name="ListLabel_20_60" style:display-name="ListLabel 60" style:family="graphic">
+      <style:paragraph-properties style:text-autospace="none"/>
+      <style:text-properties style:font-family-complex="Symbol" style:font-pitch-complex="variable"/>
+    </style:style>
+    <style:style style:name="ListLabel_20_59" style:display-name="ListLabel 59" style:family="graphic">
+      <style:paragraph-properties style:text-autospace="none"/>
+      <style:text-properties style:font-family-complex="Wingdings" style:font-pitch-complex="variable"/>
+    </style:style>
+    <style:style style:name="ListLabel_20_58" style:display-name="ListLabel 58" style:family="graphic">
+      <style:paragraph-properties style:text-autospace="none"/>
+      <style:text-properties style:font-family-complex="'Courier New'" style:font-family-generic-complex="modern" style:font-pitch-complex="variable"/>
+    </style:style>
+    <style:style style:name="ListLabel_20_57" style:display-name="ListLabel 57" style:family="graphic">
+      <style:paragraph-properties style:text-autospace="none"/>
+      <style:text-properties style:font-family-complex="Symbol" style:font-pitch-complex="variable"/>
+    </style:style>
+    <style:style style:name="ListLabel_20_56" style:display-name="ListLabel 56" style:family="graphic">
+      <style:paragraph-properties style:text-autospace="none"/>
+      <style:text-properties style:font-family-complex="Wingdings" style:font-pitch-complex="variable"/>
+    </style:style>
+    <style:style style:name="ListLabel_20_55" style:display-name="ListLabel 55" style:family="graphic">
+      <style:paragraph-properties style:text-autospace="none"/>
+      <style:text-properties style:font-family-complex="'Courier New'" style:font-family-generic-complex="modern" style:font-pitch-complex="variable"/>
+    </style:style>
+    <style:style style:name="ListLabel_20_54" style:display-name="ListLabel 54" style:family="graphic">
+      <style:paragraph-properties style:text-autospace="none"/>
+      <style:text-properties style:font-family-complex="Symbol" style:font-pitch-complex="variable"/>
+    </style:style>
+    <style:style style:name="ListLabel_20_53" style:display-name="ListLabel 53" style:family="graphic">
+      <style:paragraph-properties style:text-autospace="none"/>
+      <style:text-properties style:font-family-complex="Wingdings" style:font-pitch-complex="variable"/>
+    </style:style>
+    <style:style style:name="ListLabel_20_52" style:display-name="ListLabel 52" style:family="graphic">
+      <style:paragraph-properties style:text-autospace="none"/>
+      <style:text-properties style:font-family-complex="'Courier New'" style:font-family-generic-complex="modern" style:font-pitch-complex="variable"/>
+    </style:style>
+    <style:style style:name="ListLabel_20_51" style:display-name="ListLabel 51" style:family="graphic">
+      <style:paragraph-properties style:text-autospace="none"/>
+      <style:text-properties style:font-family-complex="Symbol" style:font-pitch-complex="variable"/>
+    </style:style>
+    <style:style style:name="ListLabel_20_50" style:display-name="ListLabel 50" style:family="graphic">
+      <style:paragraph-properties style:text-autospace="none"/>
+      <style:text-properties style:font-family-complex="Wingdings" style:font-pitch-complex="variable"/>
+    </style:style>
+    <style:style style:name="ListLabel_20_49" style:display-name="ListLabel 49" style:family="graphic">
+      <style:paragraph-properties style:text-autospace="none"/>
+      <style:text-properties style:font-family-complex="'Courier New'" style:font-family-generic-complex="modern" style:font-pitch-complex="variable"/>
+    </style:style>
+    <style:style style:name="ListLabel_20_48" style:display-name="ListLabel 48" style:family="graphic">
+      <style:paragraph-properties style:text-autospace="none"/>
+      <style:text-properties style:font-family-complex="Symbol" style:font-pitch-complex="variable"/>
+    </style:style>
+    <style:style style:name="ListLabel_20_47" style:display-name="ListLabel 47" style:family="graphic">
+      <style:paragraph-properties style:text-autospace="none"/>
+      <style:text-properties style:font-family-complex="Wingdings" style:font-pitch-complex="variable"/>
+    </style:style>
+    <style:style style:name="ListLabel_20_46" style:display-name="ListLabel 46" style:family="graphic">
+      <style:paragraph-properties style:text-autospace="none"/>
+      <style:text-properties style:font-family-complex="'Courier New'" style:font-family-generic-complex="modern" style:font-pitch-complex="variable"/>
+    </style:style>
+    <style:style style:name="ListLabel_20_45" style:display-name="ListLabel 45" style:family="graphic">
+      <style:paragraph-properties style:text-autospace="none"/>
+      <style:text-properties style:font-family-complex="Symbol" style:font-pitch-complex="variable"/>
+    </style:style>
+    <style:style style:name="ListLabel_20_44" style:display-name="ListLabel 44" style:family="graphic">
+      <style:paragraph-properties style:text-autospace="none"/>
+      <style:text-properties style:font-family-complex="Wingdings" style:font-pitch-complex="variable"/>
+    </style:style>
+    <style:style style:name="ListLabel_20_43" style:display-name="ListLabel 43" style:family="graphic">
+      <style:paragraph-properties style:text-autospace="none"/>
+      <style:text-properties style:font-family-complex="'Courier New'" style:font-family-generic-complex="modern" style:font-pitch-complex="variable"/>
+    </style:style>
+    <style:style style:name="ListLabel_20_42" style:display-name="ListLabel 42" style:family="graphic">
+      <style:paragraph-properties style:text-autospace="none"/>
+      <style:text-properties style:font-family-complex="Symbol" style:font-pitch-complex="variable"/>
+    </style:style>
+    <style:style style:name="ListLabel_20_41" style:display-name="ListLabel 41" style:family="graphic">
+      <style:paragraph-properties style:text-autospace="none"/>
+      <style:text-properties style:font-family-complex="Wingdings" style:font-pitch-complex="variable"/>
+    </style:style>
+    <style:style style:name="ListLabel_20_40" style:display-name="ListLabel 40" style:family="graphic">
+      <style:paragraph-properties style:text-autospace="none"/>
+      <style:text-properties style:font-family-complex="'Courier New'" style:font-family-generic-complex="modern" style:font-pitch-complex="variable"/>
+    </style:style>
+    <style:style style:name="ListLabel_20_39" style:display-name="ListLabel 39" style:family="graphic">
+      <style:paragraph-properties style:text-autospace="none"/>
+      <style:text-properties style:font-family-complex="Symbol" style:font-pitch-complex="variable"/>
+    </style:style>
+    <style:style style:name="ListLabel_20_38" style:display-name="ListLabel 38" style:family="graphic">
+      <style:paragraph-properties style:text-autospace="none"/>
+      <style:text-properties style:font-family-complex="Wingdings" style:font-pitch-complex="variable"/>
+    </style:style>
+    <style:style style:name="ListLabel_20_37" style:display-name="ListLabel 37" style:family="graphic">
+      <style:paragraph-properties style:text-autospace="none"/>
+      <style:text-properties style:font-family-complex="'Courier New'" style:font-family-generic-complex="modern" style:font-pitch-complex="variable"/>
+    </style:style>
+    <style:style style:name="ListLabel_20_36" style:display-name="ListLabel 36" style:family="graphic">
+      <style:paragraph-properties style:text-autospace="none"/>
+      <style:text-properties style:font-family-complex="Symbol" style:font-pitch-complex="variable"/>
+    </style:style>
+    <style:style style:name="ListLabel_20_35" style:display-name="ListLabel 35" style:family="graphic">
+      <style:paragraph-properties style:text-autospace="none"/>
+      <style:text-properties style:font-family-complex="Wingdings" style:font-pitch-complex="variable"/>
+    </style:style>
+    <style:style style:name="ListLabel_20_34" style:display-name="ListLabel 34" style:family="graphic">
+      <style:paragraph-properties style:text-autospace="none"/>
+      <style:text-properties style:font-family-complex="'Courier New'" style:font-family-generic-complex="modern" style:font-pitch-complex="variable"/>
+    </style:style>
+    <style:style style:name="ListLabel_20_33" style:display-name="ListLabel 33" style:family="graphic">
+      <style:paragraph-properties style:text-autospace="none"/>
+      <style:text-properties style:font-family-complex="Symbol" style:font-pitch-complex="variable"/>
+    </style:style>
+    <style:style style:name="ListLabel_20_32" style:display-name="ListLabel 32" style:family="graphic">
+      <style:paragraph-properties style:text-autospace="none"/>
+      <style:text-properties style:font-family-complex="Wingdings" style:font-pitch-complex="variable"/>
+    </style:style>
+    <style:style style:name="ListLabel_20_31" style:display-name="ListLabel 31" style:family="graphic">
+      <style:paragraph-properties style:text-autospace="none"/>
+      <style:text-properties style:font-family-complex="'Courier New'" style:font-family-generic-complex="modern" style:font-pitch-complex="variable"/>
+    </style:style>
+    <style:style style:name="ListLabel_20_30" style:display-name="ListLabel 30" style:family="graphic">
+      <style:paragraph-properties style:text-autospace="none"/>
+      <style:text-properties style:font-family-complex="Symbol" style:font-pitch-complex="variable"/>
+    </style:style>
+    <style:style style:name="ListLabel_20_29" style:display-name="ListLabel 29" style:family="graphic">
+      <style:paragraph-properties style:text-autospace="none"/>
+      <style:text-properties style:font-family-complex="Wingdings" style:font-pitch-complex="variable"/>
+    </style:style>
+    <style:style style:name="ListLabel_20_28" style:display-name="ListLabel 28" style:family="graphic">
+      <style:paragraph-properties style:text-autospace="none"/>
+      <style:text-properties style:font-family-complex="'Courier New'" style:font-family-generic-complex="modern" style:font-pitch-complex="variable"/>
+    </style:style>
+    <style:style style:name="ListLabel_20_27" style:display-name="ListLabel 27" style:family="graphic">
+      <style:paragraph-properties style:text-autospace="none"/>
+      <style:text-properties style:font-family-complex="Symbol" style:font-pitch-complex="variable"/>
+    </style:style>
+    <style:style style:name="ListLabel_20_26" style:display-name="ListLabel 26" style:family="graphic">
+      <style:paragraph-properties style:text-autospace="none"/>
+      <style:text-properties style:font-family-complex="Wingdings" style:font-pitch-complex="variable"/>
+    </style:style>
+    <style:style style:name="ListLabel_20_25" style:display-name="ListLabel 25" style:family="graphic">
+      <style:paragraph-properties style:text-autospace="none"/>
+      <style:text-properties style:font-family-complex="'Courier New'" style:font-family-generic-complex="modern" style:font-pitch-complex="variable"/>
+    </style:style>
+    <style:style style:name="ListLabel_20_24" style:display-name="ListLabel 24" style:family="graphic">
+      <style:paragraph-properties style:text-autospace="none"/>
+      <style:text-properties style:font-family-complex="Symbol" style:font-pitch-complex="variable"/>
+    </style:style>
+    <style:style style:name="ListLabel_20_23" style:display-name="ListLabel 23" style:family="graphic">
+      <style:paragraph-properties style:text-autospace="none"/>
+      <style:text-properties style:font-family-complex="Wingdings" style:font-pitch-complex="variable"/>
+    </style:style>
+    <style:style style:name="ListLabel_20_22" style:display-name="ListLabel 22" style:family="graphic">
+      <style:paragraph-properties style:text-autospace="none"/>
+      <style:text-properties style:font-family-complex="'Courier New'" style:font-family-generic-complex="modern" style:font-pitch-complex="variable"/>
+    </style:style>
+    <style:style style:name="ListLabel_20_21" style:display-name="ListLabel 21" style:family="graphic">
+      <style:paragraph-properties style:text-autospace="none"/>
+      <style:text-properties style:font-family-complex="Symbol" style:font-pitch-complex="variable"/>
+    </style:style>
+    <style:style style:name="ListLabel_20_20" style:display-name="ListLabel 20" style:family="graphic">
+      <style:paragraph-properties style:text-autospace="none"/>
+      <style:text-properties style:font-family-complex="Wingdings" style:font-pitch-complex="variable"/>
+    </style:style>
+    <style:style style:name="ListLabel_20_19" style:display-name="ListLabel 19" style:family="graphic">
+      <style:paragraph-properties style:text-autospace="none"/>
+      <style:text-properties style:font-family-complex="'Courier New'" style:font-family-generic-complex="modern" style:font-pitch-complex="variable"/>
+    </style:style>
+    <style:style style:name="ListLabel_20_18" style:display-name="ListLabel 18" style:family="graphic">
+      <style:paragraph-properties style:text-autospace="none"/>
+      <style:text-properties style:font-family-complex="Symbol" style:font-pitch-complex="variable"/>
+    </style:style>
+    <style:style style:name="ListLabel_20_17" style:display-name="ListLabel 17" style:family="graphic">
+      <style:paragraph-properties style:text-autospace="none"/>
+      <style:text-properties style:font-family-complex="Wingdings" style:font-pitch-complex="variable"/>
+    </style:style>
+    <style:style style:name="ListLabel_20_16" style:display-name="ListLabel 16" style:family="graphic">
+      <style:paragraph-properties style:text-autospace="none"/>
+      <style:text-properties style:font-family-complex="'Courier New'" style:font-family-generic-complex="modern" style:font-pitch-complex="variable"/>
+    </style:style>
+    <style:style style:name="ListLabel_20_15" style:display-name="ListLabel 15" style:family="graphic">
+      <style:paragraph-properties style:text-autospace="none"/>
+      <style:text-properties style:font-family-complex="Symbol" style:font-pitch-complex="variable"/>
+    </style:style>
+    <style:style style:name="ListLabel_20_14" style:display-name="ListLabel 14" style:family="graphic">
+      <style:paragraph-properties style:text-autospace="none"/>
+      <style:text-properties style:font-family-complex="Wingdings" style:font-pitch-complex="variable"/>
+    </style:style>
+    <style:style style:name="ListLabel_20_13" style:display-name="ListLabel 13" style:family="graphic">
+      <style:paragraph-properties style:text-autospace="none"/>
+      <style:text-properties style:font-family-complex="'Courier New'" style:font-family-generic-complex="modern" style:font-pitch-complex="variable"/>
+    </style:style>
+    <style:style style:name="ListLabel_20_12" style:display-name="ListLabel 12" style:family="graphic">
+      <style:paragraph-properties style:text-autospace="none"/>
+      <style:text-properties style:font-family-complex="Symbol" style:font-pitch-complex="variable"/>
+    </style:style>
+    <style:style style:name="ListLabel_20_11" style:display-name="ListLabel 11" style:family="graphic">
+      <style:paragraph-properties style:text-autospace="none"/>
+      <style:text-properties style:font-family-complex="Wingdings" style:font-pitch-complex="variable"/>
+    </style:style>
+    <style:style style:name="ListLabel_20_10" style:display-name="ListLabel 10" style:family="graphic">
+      <style:paragraph-properties style:text-autospace="none"/>
+      <style:text-properties style:font-family-complex="'Courier New'" style:font-family-generic-complex="modern" style:font-pitch-complex="variable"/>
+    </style:style>
+    <style:style style:name="ListLabel_20_9" style:display-name="ListLabel 9" style:family="graphic">
+      <style:paragraph-properties style:text-autospace="none"/>
+      <style:text-properties style:font-family-asian="Calibri" style:font-family-generic-asian="swiss" style:font-pitch-asian="variable" style:font-family-complex="'Times New Roman'" style:font-family-generic-complex="roman" style:font-pitch-complex="variable"/>
+    </style:style>
+    <style:style style:name="ListLabel_20_8" style:display-name="ListLabel 8" style:family="graphic">
+      <style:paragraph-properties style:text-autospace="none"/>
+      <style:text-properties style:text-underline-style="none" fo:font-weight="normal"/>
+    </style:style>
+    <style:style style:name="ListLabel_20_7" style:display-name="ListLabel 7" style:family="graphic">
+      <style:paragraph-properties style:text-autospace="none"/>
+      <style:text-properties style:text-underline-style="none" fo:font-weight="normal"/>
+    </style:style>
+    <style:style style:name="ListLabel_20_6" style:display-name="ListLabel 6" style:family="graphic">
+      <style:paragraph-properties style:text-autospace="none"/>
+      <style:text-properties style:text-underline-style="none" fo:font-weight="normal"/>
+    </style:style>
+    <style:style style:name="ListLabel_20_5" style:display-name="ListLabel 5" style:family="graphic">
+      <style:paragraph-properties style:text-autospace="none"/>
+      <style:text-properties style:text-underline-style="none" fo:font-weight="normal"/>
+    </style:style>
+    <style:style style:name="ListLabel_20_4" style:display-name="ListLabel 4" style:family="graphic">
+      <style:paragraph-properties style:text-autospace="none"/>
+      <style:text-properties style:text-underline-style="none" fo:font-weight="normal"/>
+    </style:style>
+    <style:style style:name="ListLabel_20_3" style:display-name="ListLabel 3" style:family="graphic">
+      <style:paragraph-properties style:text-autospace="none"/>
+      <style:text-properties style:text-underline-style="none" fo:font-weight="normal"/>
+    </style:style>
+    <style:style style:name="ListLabel_20_2" style:display-name="ListLabel 2" style:family="graphic">
+      <style:paragraph-properties style:text-autospace="none"/>
+      <style:text-properties style:text-underline-style="none" fo:font-weight="normal"/>
+    </style:style>
+    <style:style style:name="ListLabel_20_1" style:display-name="ListLabel 1" style:family="graphic">
+      <style:paragraph-properties style:text-autospace="none"/>
+      <style:text-properties style:text-underline-style="none" fo:font-weight="normal"/>
+    </style:style>
+    <style:style style:name="Bullets" style:family="graphic">
+      <style:paragraph-properties style:text-autospace="none"/>
+      <style:text-properties fo:font-family="OpenSymbol, 'Arial Unicode MS'" style:font-family-generic="roman" style:font-pitch="variable" style:font-family-asian="OpenSymbol, 'Arial Unicode MS'" style:font-pitch-asian="variable" style:font-family-complex="OpenSymbol, 'Arial Unicode MS'" style:font-family-generic-complex="roman" style:font-pitch-complex="variable"/>
+    </style:style>
+    <style:style style:name="Unresolved_20_Mention" style:display-name="Unresolved Mention" style:family="graphic">
+      <style:paragraph-properties style:text-autospace="none"/>
+      <style:text-properties fo:color="#605e5c"/>
+    </style:style>
+    <style:style style:name="Default_20_Paragraph_20_Font" style:display-name="Default Paragraph Font" style:family="graphic">
+      <style:paragraph-properties style:text-autospace="none"/>
+    </style:style>
+    <style:style style:name="Table_20_Heading" style:display-name="Table Heading" style:family="graphic">
+      <style:paragraph-properties fo:margin-top="0cm" fo:margin-bottom="0cm" fo:line-height="100%" fo:text-align="center" style:text-autospace="none" style:writing-mode="lr-tb"/>
+      <style:text-properties style:use-window-font-color="true" fo:font-family="'Liberation Serif', 'Times New Roman'" style:font-family-generic="roman" style:font-pitch="variable" fo:font-size="12pt" fo:language="en" fo:country="CA" fo:font-weight="bold" style:letter-kerning="true" style:font-family-asian="NSimSun" style:font-pitch-asian="variable" style:font-size-asian="12pt" style:language-asian="zh" style:country-asian="CN" style:font-weight-asian="bold" style:font-family-complex="'Liberation Serif', 'Times New Roman'" style:font-family-generic-complex="roman" style:font-pitch-complex="variable" style:font-size-complex="12pt" style:language-complex="hi" style:country-complex="IN" style:font-weight-complex="bold"/>
+    </style:style>
+    <style:style style:name="Table_20_Contents" style:display-name="Table Contents" style:family="graphic">
+      <style:paragraph-properties fo:margin-top="0cm" fo:margin-bottom="0cm" fo:line-height="100%" fo:text-align="start" style:text-autospace="none" style:writing-mode="lr-tb"/>
+      <style:text-properties style:use-window-font-color="true" fo:font-family="'Liberation Serif', 'Times New Roman'" style:font-family-generic="roman" style:font-pitch="variable" fo:font-size="12pt" fo:language="en" fo:country="CA" style:letter-kerning="true" style:font-family-asian="NSimSun" style:font-pitch-asian="variable" style:font-size-asian="12pt" style:language-asian="zh" style:country-asian="CN" style:font-family-complex="'Liberation Serif', 'Times New Roman'" style:font-family-generic-complex="roman" style:font-pitch-complex="variable" style:font-size-complex="12pt" style:language-complex="hi" style:country-complex="IN"/>
+    </style:style>
+    <style:style style:name="List_20_Paragraph" style:display-name="List Paragraph" style:family="graphic">
+      <style:paragraph-properties fo:margin-left="2.24cm" fo:margin-right="0cm" fo:margin-top="0cm" fo:margin-bottom="0.497cm" fo:line-height="108%" fo:text-align="start" fo:text-indent="0cm" style:text-autospace="none" style:writing-mode="lr-tb"/>
+      <style:text-properties style:use-window-font-color="true" fo:font-family="Calibri" style:font-family-generic="roman" style:font-pitch="variable" fo:font-size="11pt" fo:language="en" fo:country="US" style:letter-kerning="false" style:font-family-asian="Calibri" style:font-family-generic-asian="swiss" style:font-pitch-asian="variable" style:font-size-asian="11pt" style:language-asian="en" style:country-asian="US" style:font-family-complex="Calibri" style:font-family-generic-complex="roman" style:font-pitch-complex="variable" style:font-size-complex="11pt" style:language-complex="ar" style:country-complex="SA"/>
+    </style:style>
+    <style:style style:name="Index" style:family="graphic">
+      <style:paragraph-properties fo:margin-top="0cm" fo:margin-bottom="0.497cm" fo:line-height="108%" fo:text-align="start" style:text-autospace="none" style:writing-mode="lr-tb"/>
+      <style:text-properties style:use-window-font-color="true" fo:font-family="Calibri" style:font-family-generic="roman" style:font-pitch="variable" fo:font-size="11pt" fo:language="zxx" fo:country="none" style:letter-kerning="false" style:font-family-asian="Calibri" style:font-family-generic-asian="swiss" style:font-pitch-asian="variable" style:font-size-asian="11pt" style:language-asian="zxx" style:country-asian="none" style:font-family-complex="Calibri" style:font-family-generic-complex="roman" style:font-pitch-complex="variable" style:font-size-complex="11pt" style:language-complex="zxx" style:country-complex="none"/>
+    </style:style>
+    <style:style style:name="Caption" style:family="graphic">
+      <style:paragraph-properties fo:margin-top="0.374cm" fo:margin-bottom="0.374cm" fo:line-height="108%" fo:text-align="start" style:text-autospace="none" style:writing-mode="lr-tb"/>
+      <style:text-properties style:use-window-font-color="true" fo:font-family="Calibri" style:font-family-generic="roman" style:font-pitch="variable" fo:font-size="12pt" fo:language="en" fo:country="US" fo:font-style="italic" style:letter-kerning="false" style:font-family-asian="Calibri" style:font-family-generic-asian="swiss" style:font-pitch-asian="variable" style:font-size-asian="12pt" style:language-asian="en" style:country-asian="US" style:font-style-asian="italic" style:font-family-complex="Calibri" style:font-family-generic-complex="roman" style:font-pitch-complex="variable" style:font-size-complex="12pt" style:language-complex="ar" style:country-complex="SA" style:font-style-complex="italic"/>
+    </style:style>
+    <style:style style:name="List" style:family="graphic">
+      <style:paragraph-properties fo:margin-top="0cm" fo:margin-bottom="0.436cm" fo:line-height="115%" fo:text-align="start" style:text-autospace="none" style:writing-mode="lr-tb"/>
+      <style:text-properties style:use-window-font-color="true" fo:font-family="Calibri" style:font-family-generic="roman" style:font-pitch="variable" fo:font-size="11pt" fo:language="en" fo:country="US" style:letter-kerning="false" style:font-family-asian="Calibri" style:font-family-generic-asian="swiss" style:font-pitch-asian="variable" style:font-size-asian="11pt" style:language-asian="en" style:country-asian="US" style:font-family-complex="Calibri" style:font-family-generic-complex="roman" style:font-pitch-complex="variable" style:font-size-complex="11pt" style:language-complex="ar" style:country-complex="SA"/>
+    </style:style>
+    <style:style style:name="Text_20_Body" style:display-name="Text Body" style:family="graphic">
+      <style:paragraph-properties fo:margin-top="0cm" fo:margin-bottom="0.436cm" fo:line-height="115%" fo:text-align="start" style:text-autospace="none" style:writing-mode="lr-tb"/>
+      <style:text-properties style:use-window-font-color="true" fo:font-family="Calibri" style:font-family-generic="roman" style:font-pitch="variable" fo:font-size="11pt" fo:language="en" fo:country="US" style:letter-kerning="false" style:font-family-asian="Calibri" style:font-family-generic-asian="swiss" style:font-pitch-asian="variable" style:font-size-asian="11pt" style:language-asian="en" style:country-asian="US" style:font-family-complex="Calibri" style:font-family-generic-complex="roman" style:font-pitch-complex="variable" style:font-size-complex="11pt" style:language-complex="ar" style:country-complex="SA"/>
+    </style:style>
+    <style:style style:name="Hyperlink" style:family="graphic">
+      <style:paragraph-properties style:text-autospace="none"/>
+      <style:text-properties fo:color="#0563c1" style:text-underline-style="solid" style:text-underline-width="auto" style:text-underline-color="font-color"/>
+    </style:style>
     <style:style style:name="Default-background" style:family="presentation">
       <style:graphic-properties draw:stroke="none" draw:fill="none"/>
       <style:text-properties style:letter-kerning="true"/>
@@ -1282,19 +1947,18 @@
     </style:style>
     <style:style style:name="MP3" style:family="paragraph">
       <style:paragraph-properties fo:text-align="center"/>
-      <style:text-properties fo:font-size="18pt"/>
     </style:style>
     <style:style style:name="MP4" style:family="paragraph">
       <style:paragraph-properties style:font-independent-line-spacing="true"/>
       <style:text-properties fo:font-size="18pt"/>
     </style:style>
-    <style:style style:name="MP5" style:family="paragraph">
-      <style:text-properties fo:font-size="18pt"/>
-    </style:style>
     <style:style style:name="MT1" style:family="text">
+      <style:text-properties fo:font-size="14pt" style:font-size-asian="14pt" style:font-size-complex="14pt"/>
+    </style:style>
+    <style:style style:name="MT2" style:family="text">
       <style:text-properties style:text-line-through-style="none" fo:font-family="Arial" fo:font-size="44pt" fo:letter-spacing="normal" fo:font-style="normal" style:text-underline-style="none" fo:font-weight="normal" style:font-size-asian="44pt" style:font-style-asian="normal" style:font-weight-asian="normal" style:font-size-complex="44pt" style:font-style-complex="normal" style:font-weight-complex="normal"/>
     </style:style>
-    <style:style style:name="MT2" style:family="text">
+    <style:style style:name="MT3" style:family="text">
       <style:text-properties style:text-line-through-style="none" fo:font-family="Arial" fo:font-size="32pt" fo:letter-spacing="normal" fo:font-style="normal" style:text-underline-style="none" fo:font-weight="normal" style:font-size-asian="32pt" style:font-style-asian="normal" style:font-weight-asian="normal" style:font-size-complex="32pt" style:font-style-complex="normal" style:font-weight-complex="normal"/>
     </style:style>
     <text:list-style style:name="ML1">
@@ -1382,48 +2046,6 @@
       </text:list-level-style-bullet>
     </text:list-style>
     <text:list-style style:name="ML3">
-      <text:list-level-style-bullet text:level="1" text:bullet-char="●">
-        <style:list-level-properties text:min-label-width="0.6cm"/>
-        <style:text-properties fo:font-family="StarSymbol" style:use-window-font-color="true" fo:font-size="45%"/>
-      </text:list-level-style-bullet>
-      <text:list-level-style-bullet text:level="2" text:bullet-char="●">
-        <style:list-level-properties text:space-before="0.6cm" text:min-label-width="0.6cm"/>
-        <style:text-properties fo:font-family="StarSymbol" style:use-window-font-color="true" fo:font-size="45%"/>
-      </text:list-level-style-bullet>
-      <text:list-level-style-bullet text:level="3" text:bullet-char="●">
-        <style:list-level-properties text:space-before="1.2cm" text:min-label-width="0.6cm"/>
-        <style:text-properties fo:font-family="StarSymbol" style:use-window-font-color="true" fo:font-size="45%"/>
-      </text:list-level-style-bullet>
-      <text:list-level-style-bullet text:level="4" text:bullet-char="●">
-        <style:list-level-properties text:space-before="1.8cm" text:min-label-width="0.6cm"/>
-        <style:text-properties fo:font-family="StarSymbol" style:use-window-font-color="true" fo:font-size="45%"/>
-      </text:list-level-style-bullet>
-      <text:list-level-style-bullet text:level="5" text:bullet-char="●">
-        <style:list-level-properties text:space-before="2.4cm" text:min-label-width="0.6cm"/>
-        <style:text-properties fo:font-family="StarSymbol" style:use-window-font-color="true" fo:font-size="45%"/>
-      </text:list-level-style-bullet>
-      <text:list-level-style-bullet text:level="6" text:bullet-char="●">
-        <style:list-level-properties text:space-before="3cm" text:min-label-width="0.6cm"/>
-        <style:text-properties fo:font-family="StarSymbol" style:use-window-font-color="true" fo:font-size="45%"/>
-      </text:list-level-style-bullet>
-      <text:list-level-style-bullet text:level="7" text:bullet-char="●">
-        <style:list-level-properties text:space-before="3.6cm" text:min-label-width="0.6cm"/>
-        <style:text-properties fo:font-family="StarSymbol" style:use-window-font-color="true" fo:font-size="45%"/>
-      </text:list-level-style-bullet>
-      <text:list-level-style-bullet text:level="8" text:bullet-char="●">
-        <style:list-level-properties text:space-before="4.2cm" text:min-label-width="0.6cm"/>
-        <style:text-properties fo:font-family="StarSymbol" style:use-window-font-color="true" fo:font-size="45%"/>
-      </text:list-level-style-bullet>
-      <text:list-level-style-bullet text:level="9" text:bullet-char="●">
-        <style:list-level-properties text:space-before="4.8cm" text:min-label-width="0.6cm"/>
-        <style:text-properties fo:font-family="StarSymbol" style:use-window-font-color="true" fo:font-size="45%"/>
-      </text:list-level-style-bullet>
-      <text:list-level-style-bullet text:level="10" text:bullet-char="●">
-        <style:list-level-properties text:space-before="5.4cm" text:min-label-width="0.6cm"/>
-        <style:text-properties fo:font-family="StarSymbol" style:use-window-font-color="true" fo:font-size="45%"/>
-      </text:list-level-style-bullet>
-    </text:list-style>
-    <text:list-style style:name="ML4">
       <text:list-level-style-bullet text:level="1" text:bullet-char="●">
         <style:list-level-properties text:space-before="0.3cm" text:min-label-width="0.9cm"/>
         <style:text-properties fo:font-family="StarSymbol" style:use-window-font-color="true" fo:font-size="45%"/>
@@ -1484,28 +2106,36 @@
       <draw:frame draw:style-name="Mgr1" draw:text-style-name="MP1" draw:layer="backgroundobjects" svg:width="9.369cm" svg:height="1.396cm" svg:x="0cm" svg:y="0cm" presentation:class="header">
         <draw:text-box>
           <text:p text:style-name="MP1">
-            <presentation:header/>
+            <text:span text:style-name="MT1">
+              <presentation:header/>
+            </text:span>
           </text:p>
         </draw:text-box>
       </draw:frame>
       <draw:frame draw:style-name="Mgr1" draw:text-style-name="MP2" draw:layer="backgroundobjects" svg:width="9.369cm" svg:height="1.396cm" svg:x="12.22cm" svg:y="0cm" presentation:class="date-time">
         <draw:text-box>
           <text:p text:style-name="MP2">
-            <presentation:date-time/>
+            <text:span text:style-name="MT1">
+              <presentation:date-time/>
+            </text:span>
           </text:p>
         </draw:text-box>
       </draw:frame>
       <draw:frame draw:style-name="Mgr2" draw:text-style-name="MP1" draw:layer="backgroundobjects" svg:width="9.369cm" svg:height="1.396cm" svg:x="0cm" svg:y="26.543cm" presentation:class="footer">
         <draw:text-box>
           <text:p text:style-name="MP1">
-            <presentation:footer/>
+            <text:span text:style-name="MT1">
+              <presentation:footer/>
+            </text:span>
           </text:p>
         </draw:text-box>
       </draw:frame>
       <draw:frame draw:style-name="Mgr2" draw:text-style-name="MP2" draw:layer="backgroundobjects" svg:width="9.369cm" svg:height="1.396cm" svg:x="12.22cm" svg:y="26.543cm" presentation:class="page-number">
         <draw:text-box>
           <text:p text:style-name="MP2">
-            <text:page-number>&lt;number&gt;</text:page-number>
+            <text:span text:style-name="MT1">
+              <text:page-number>&lt;number&gt;</text:page-number>
+            </text:span>
           </text:p>
         </draw:text-box>
       </draw:frame>
@@ -1514,7 +2144,7 @@
       <draw:frame draw:name="PlaceHolder 1" presentation:style-name="Mpr1" draw:text-style-name="MP4" draw:layer="backgroundobjects" svg:width="25.198cm" svg:height="2.628cm" svg:x="1.4cm" svg:y="0.628cm" presentation:class="title" presentation:user-transformed="true">
         <draw:text-box>
           <text:p text:style-name="MP3">
-            <text:span text:style-name="MT1">Click to edit the title text format</text:span>
+            <text:span text:style-name="MT2">Click to edit the title text format</text:span>
           </text:p>
         </draw:text-box>
       </draw:frame>
@@ -1529,28 +2159,36 @@
         <draw:frame presentation:style-name="Mpr2" draw:text-style-name="MP1" draw:layer="backgroundobjects" svg:width="9.369cm" svg:height="1.396cm" svg:x="0cm" svg:y="0cm" presentation:class="header">
           <draw:text-box>
             <text:p text:style-name="MP1">
-              <presentation:header/>
+              <text:span text:style-name="MT1">
+                <presentation:header/>
+              </text:span>
             </text:p>
           </draw:text-box>
         </draw:frame>
         <draw:frame presentation:style-name="Mpr2" draw:text-style-name="MP2" draw:layer="backgroundobjects" svg:width="9.369cm" svg:height="1.396cm" svg:x="12.22cm" svg:y="0cm" presentation:class="date-time">
           <draw:text-box>
             <text:p text:style-name="MP2">
-              <presentation:date-time/>
+              <text:span text:style-name="MT1">
+                <presentation:date-time/>
+              </text:span>
             </text:p>
           </draw:text-box>
         </draw:frame>
         <draw:frame presentation:style-name="Mpr3" draw:text-style-name="MP1" draw:layer="backgroundobjects" svg:width="9.369cm" svg:height="1.396cm" svg:x="0cm" svg:y="26.543cm" presentation:class="footer">
           <draw:text-box>
             <text:p text:style-name="MP1">
-              <presentation:footer/>
+              <text:span text:style-name="MT1">
+                <presentation:footer/>
+              </text:span>
             </text:p>
           </draw:text-box>
         </draw:frame>
         <draw:frame presentation:style-name="Mpr3" draw:text-style-name="MP2" draw:layer="backgroundobjects" svg:width="9.369cm" svg:height="1.396cm" svg:x="12.22cm" svg:y="26.543cm" presentation:class="page-number">
           <draw:text-box>
             <text:p text:style-name="MP2">
-              <text:page-number>&lt;number&gt;</text:page-number>
+              <text:span text:style-name="MT1">
+                <text:page-number>&lt;number&gt;</text:page-number>
+              </text:span>
             </text:p>
           </draw:text-box>
         </draw:frame>
@@ -1560,56 +2198,56 @@
       <draw:frame draw:name="PlaceHolder 1" presentation:style-name="Mpr4" draw:text-style-name="MP4" draw:layer="backgroundobjects" svg:width="25.198cm" svg:height="2.628cm" svg:x="1.4cm" svg:y="0.628cm" presentation:class="title" presentation:user-transformed="true">
         <draw:text-box>
           <text:p text:style-name="MP3">
-            <text:span text:style-name="MT1">Click to edit the title text format</text:span>
+            <text:span text:style-name="MT2">Click to edit the title text format</text:span>
           </text:p>
         </draw:text-box>
       </draw:frame>
       <draw:frame draw:name="PlaceHolder 2" presentation:style-name="Mpr5" draw:text-style-name="MP4" draw:layer="backgroundobjects" svg:width="25.198cm" svg:height="9.133cm" svg:x="1.4cm" svg:y="3.685cm" presentation:class="outline" presentation:user-transformed="true">
         <draw:text-box>
-          <text:p text:style-name="MP5">
-            <text:span text:style-name="MT2">Click to edit the outline text format</text:span>
+          <text:p>
+            <text:span text:style-name="MT3">Click to edit the outline text format</text:span>
           </text:p>
-          <text:list text:style-name="ML4">
+          <text:list text:style-name="ML3">
             <text:list-item>
               <text:list>
                 <text:list-item>
-                  <text:p text:style-name="MP5">
-                    <text:span text:style-name="MT2">Second Outline Level</text:span>
+                  <text:p>
+                    <text:span text:style-name="MT3">Second Outline Level</text:span>
                   </text:p>
                   <text:list>
                     <text:list-item>
-                      <text:p text:style-name="MP5">
-                        <text:span text:style-name="MT2">Third Outline Level</text:span>
+                      <text:p>
+                        <text:span text:style-name="MT3">Third Outline Level</text:span>
                       </text:p>
                       <text:list>
                         <text:list-item>
-                          <text:p text:style-name="MP5">
-                            <text:span text:style-name="MT2">Fourth Outline Level</text:span>
+                          <text:p>
+                            <text:span text:style-name="MT3">Fourth Outline Level</text:span>
                           </text:p>
                           <text:list>
                             <text:list-item>
-                              <text:p text:style-name="MP5">
-                                <text:span text:style-name="MT2">Fifth Outline Level</text:span>
+                              <text:p>
+                                <text:span text:style-name="MT3">Fifth Outline Level</text:span>
                               </text:p>
                               <text:list>
                                 <text:list-item>
-                                  <text:p text:style-name="MP5">
-                                    <text:span text:style-name="MT2">Sixth Outline Level</text:span>
+                                  <text:p>
+                                    <text:span text:style-name="MT3">Sixth Outline Level</text:span>
                                   </text:p>
                                   <text:list>
                                     <text:list-item>
-                                      <text:p text:style-name="MP5">
-                                        <text:span text:style-name="MT2">Seventh Outline Level</text:span>
+                                      <text:p>
+                                        <text:span text:style-name="MT3">Seventh Outline Level</text:span>
                                       </text:p>
                                       <text:list>
                                         <text:list-item>
-                                          <text:p text:style-name="MP5">
-                                            <text:span text:style-name="MT2">Eighth Outline Level</text:span>
+                                          <text:p>
+                                            <text:span text:style-name="MT3">Eighth Outline Level</text:span>
                                           </text:p>
                                           <text:list>
                                             <text:list-item>
-                                              <text:p text:style-name="MP5">
-                                                <text:span text:style-name="MT2">Ninth Outline Level</text:span>
+                                              <text:p>
+                                                <text:span text:style-name="MT3">Ninth Outline Level</text:span>
                                               </text:p>
                                             </text:list-item>
                                           </text:list>
@@ -1632,6 +2270,7 @@
         </draw:text-box>
       </draw:frame>
       <presentation:notes style:page-layout-name="PM0">
+        <office:forms form:automatic-focus="false" form:apply-design-mode="false"/>
         <draw:page-thumbnail presentation:style-name="Default_20_1-title" draw:layer="backgroundobjects" svg:width="18.623cm" svg:height="10.476cm" svg:x="1.483cm" svg:y="2.123cm" presentation:class="page"/>
         <draw:frame presentation:style-name="Default_20_1-notes" draw:layer="backgroundobjects" svg:width="17.271cm" svg:height="12.572cm" svg:x="2.159cm" svg:y="13.271cm" presentation:class="notes" presentation:placeholder="true">
           <draw:text-box/>
@@ -1639,28 +2278,36 @@
         <draw:frame presentation:style-name="Mpr6" draw:text-style-name="MP1" draw:layer="backgroundobjects" svg:width="9.369cm" svg:height="1.396cm" svg:x="0cm" svg:y="0cm" presentation:class="header">
           <draw:text-box>
             <text:p text:style-name="MP1">
-              <presentation:header/>
+              <text:span text:style-name="MT1">
+                <presentation:header/>
+              </text:span>
             </text:p>
           </draw:text-box>
         </draw:frame>
         <draw:frame presentation:style-name="Mpr6" draw:text-style-name="MP2" draw:layer="backgroundobjects" svg:width="9.369cm" svg:height="1.396cm" svg:x="12.22cm" svg:y="0cm" presentation:class="date-time">
           <draw:text-box>
             <text:p text:style-name="MP2">
-              <presentation:date-time/>
+              <text:span text:style-name="MT1">
+                <presentation:date-time/>
+              </text:span>
             </text:p>
           </draw:text-box>
         </draw:frame>
         <draw:frame presentation:style-name="Mpr7" draw:text-style-name="MP1" draw:layer="backgroundobjects" svg:width="9.369cm" svg:height="1.396cm" svg:x="0cm" svg:y="26.543cm" presentation:class="footer">
           <draw:text-box>
             <text:p text:style-name="MP1">
-              <presentation:footer/>
+              <text:span text:style-name="MT1">
+                <presentation:footer/>
+              </text:span>
             </text:p>
           </draw:text-box>
         </draw:frame>
         <draw:frame presentation:style-name="Mpr7" draw:text-style-name="MP2" draw:layer="backgroundobjects" svg:width="9.369cm" svg:height="1.396cm" svg:x="12.22cm" svg:y="26.543cm" presentation:class="page-number">
           <draw:text-box>
             <text:p text:style-name="MP2">
-              <text:page-number>&lt;number&gt;</text:page-number>
+              <text:span text:style-name="MT1">
+                <text:page-number>&lt;number&gt;</text:page-number>
+              </text:span>
             </text:p>
           </draw:text-box>
         </draw:frame>

</xml_diff>